<commit_message>
Updated CSS Presentation and Added more demos
</commit_message>
<xml_diff>
--- a/03.css-basics.pptx
+++ b/03.css-basics.pptx
@@ -16,14 +16,17 @@
     <p:sldId id="263" r:id="rId10"/>
     <p:sldId id="264" r:id="rId11"/>
     <p:sldId id="265" r:id="rId12"/>
-    <p:sldId id="268" r:id="rId13"/>
-    <p:sldId id="266" r:id="rId14"/>
+    <p:sldId id="266" r:id="rId13"/>
+    <p:sldId id="268" r:id="rId14"/>
     <p:sldId id="269" r:id="rId15"/>
     <p:sldId id="270" r:id="rId16"/>
     <p:sldId id="271" r:id="rId17"/>
     <p:sldId id="272" r:id="rId18"/>
     <p:sldId id="273" r:id="rId19"/>
-    <p:sldId id="275" r:id="rId20"/>
+    <p:sldId id="276" r:id="rId20"/>
+    <p:sldId id="277" r:id="rId21"/>
+    <p:sldId id="278" r:id="rId22"/>
+    <p:sldId id="275" r:id="rId23"/>
   </p:sldIdLst>
   <p:sldSz cx="12192000" cy="6858000"/>
   <p:notesSz cx="6858000" cy="9144000"/>
@@ -301,7 +304,7 @@
           <a:p>
             <a:fld id="{5BB930E1-A780-4904-8CE4-6EDEFF637E4F}" type="datetimeFigureOut">
               <a:rPr lang="en-US" smtClean="0"/>
-              <a:t>11/13/2014</a:t>
+              <a:t>11/16/2014</a:t>
             </a:fld>
             <a:endParaRPr lang="en-US"/>
           </a:p>
@@ -613,7 +616,7 @@
           <a:p>
             <a:fld id="{5BB930E1-A780-4904-8CE4-6EDEFF637E4F}" type="datetimeFigureOut">
               <a:rPr lang="en-US" smtClean="0"/>
-              <a:t>11/13/2014</a:t>
+              <a:t>11/16/2014</a:t>
             </a:fld>
             <a:endParaRPr lang="en-US"/>
           </a:p>
@@ -835,7 +838,7 @@
           <a:p>
             <a:fld id="{5BB930E1-A780-4904-8CE4-6EDEFF637E4F}" type="datetimeFigureOut">
               <a:rPr lang="en-US" smtClean="0"/>
-              <a:t>11/13/2014</a:t>
+              <a:t>11/16/2014</a:t>
             </a:fld>
             <a:endParaRPr lang="en-US"/>
           </a:p>
@@ -1126,7 +1129,7 @@
           <a:p>
             <a:fld id="{5BB930E1-A780-4904-8CE4-6EDEFF637E4F}" type="datetimeFigureOut">
               <a:rPr lang="en-US" smtClean="0"/>
-              <a:t>11/13/2014</a:t>
+              <a:t>11/16/2014</a:t>
             </a:fld>
             <a:endParaRPr lang="en-US"/>
           </a:p>
@@ -1580,7 +1583,7 @@
           <a:p>
             <a:fld id="{5BB930E1-A780-4904-8CE4-6EDEFF637E4F}" type="datetimeFigureOut">
               <a:rPr lang="en-US" smtClean="0"/>
-              <a:t>11/13/2014</a:t>
+              <a:t>11/16/2014</a:t>
             </a:fld>
             <a:endParaRPr lang="en-US"/>
           </a:p>
@@ -2156,7 +2159,7 @@
           <a:p>
             <a:fld id="{5BB930E1-A780-4904-8CE4-6EDEFF637E4F}" type="datetimeFigureOut">
               <a:rPr lang="en-US" smtClean="0"/>
-              <a:t>11/13/2014</a:t>
+              <a:t>11/16/2014</a:t>
             </a:fld>
             <a:endParaRPr lang="en-US"/>
           </a:p>
@@ -3008,7 +3011,7 @@
           <a:p>
             <a:fld id="{5BB930E1-A780-4904-8CE4-6EDEFF637E4F}" type="datetimeFigureOut">
               <a:rPr lang="en-US" smtClean="0"/>
-              <a:t>11/13/2014</a:t>
+              <a:t>11/16/2014</a:t>
             </a:fld>
             <a:endParaRPr lang="en-US"/>
           </a:p>
@@ -3213,7 +3216,7 @@
           <a:p>
             <a:fld id="{5BB930E1-A780-4904-8CE4-6EDEFF637E4F}" type="datetimeFigureOut">
               <a:rPr lang="en-US" smtClean="0"/>
-              <a:t>11/13/2014</a:t>
+              <a:t>11/16/2014</a:t>
             </a:fld>
             <a:endParaRPr lang="en-US"/>
           </a:p>
@@ -3427,7 +3430,7 @@
           <a:p>
             <a:fld id="{5BB930E1-A780-4904-8CE4-6EDEFF637E4F}" type="datetimeFigureOut">
               <a:rPr lang="en-US" smtClean="0"/>
-              <a:t>11/13/2014</a:t>
+              <a:t>11/16/2014</a:t>
             </a:fld>
             <a:endParaRPr lang="en-US"/>
           </a:p>
@@ -3632,7 +3635,7 @@
           <a:p>
             <a:fld id="{5BB930E1-A780-4904-8CE4-6EDEFF637E4F}" type="datetimeFigureOut">
               <a:rPr lang="en-US" smtClean="0"/>
-              <a:t>11/13/2014</a:t>
+              <a:t>11/16/2014</a:t>
             </a:fld>
             <a:endParaRPr lang="en-US"/>
           </a:p>
@@ -3912,7 +3915,7 @@
           <a:p>
             <a:fld id="{5BB930E1-A780-4904-8CE4-6EDEFF637E4F}" type="datetimeFigureOut">
               <a:rPr lang="en-US" smtClean="0"/>
-              <a:t>11/13/2014</a:t>
+              <a:t>11/16/2014</a:t>
             </a:fld>
             <a:endParaRPr lang="en-US"/>
           </a:p>
@@ -4179,7 +4182,7 @@
           <a:p>
             <a:fld id="{5BB930E1-A780-4904-8CE4-6EDEFF637E4F}" type="datetimeFigureOut">
               <a:rPr lang="en-US" smtClean="0"/>
-              <a:t>11/13/2014</a:t>
+              <a:t>11/16/2014</a:t>
             </a:fld>
             <a:endParaRPr lang="en-US"/>
           </a:p>
@@ -4594,7 +4597,7 @@
           <a:p>
             <a:fld id="{5BB930E1-A780-4904-8CE4-6EDEFF637E4F}" type="datetimeFigureOut">
               <a:rPr lang="en-US" smtClean="0"/>
-              <a:t>11/13/2014</a:t>
+              <a:t>11/16/2014</a:t>
             </a:fld>
             <a:endParaRPr lang="en-US"/>
           </a:p>
@@ -4742,7 +4745,7 @@
           <a:p>
             <a:fld id="{5BB930E1-A780-4904-8CE4-6EDEFF637E4F}" type="datetimeFigureOut">
               <a:rPr lang="en-US" smtClean="0"/>
-              <a:t>11/13/2014</a:t>
+              <a:t>11/16/2014</a:t>
             </a:fld>
             <a:endParaRPr lang="en-US"/>
           </a:p>
@@ -4867,7 +4870,7 @@
           <a:p>
             <a:fld id="{5BB930E1-A780-4904-8CE4-6EDEFF637E4F}" type="datetimeFigureOut">
               <a:rPr lang="en-US" smtClean="0"/>
-              <a:t>11/13/2014</a:t>
+              <a:t>11/16/2014</a:t>
             </a:fld>
             <a:endParaRPr lang="en-US"/>
           </a:p>
@@ -5146,7 +5149,7 @@
           <a:p>
             <a:fld id="{5BB930E1-A780-4904-8CE4-6EDEFF637E4F}" type="datetimeFigureOut">
               <a:rPr lang="en-US" smtClean="0"/>
-              <a:t>11/13/2014</a:t>
+              <a:t>11/16/2014</a:t>
             </a:fld>
             <a:endParaRPr lang="en-US"/>
           </a:p>
@@ -5458,7 +5461,7 @@
           <a:p>
             <a:fld id="{5BB930E1-A780-4904-8CE4-6EDEFF637E4F}" type="datetimeFigureOut">
               <a:rPr lang="en-US" smtClean="0"/>
-              <a:t>11/13/2014</a:t>
+              <a:t>11/16/2014</a:t>
             </a:fld>
             <a:endParaRPr lang="en-US"/>
           </a:p>
@@ -5711,7 +5714,7 @@
           <a:p>
             <a:fld id="{5BB930E1-A780-4904-8CE4-6EDEFF637E4F}" type="datetimeFigureOut">
               <a:rPr lang="en-US" smtClean="0"/>
-              <a:t>11/13/2014</a:t>
+              <a:t>11/16/2014</a:t>
             </a:fld>
             <a:endParaRPr lang="en-US"/>
           </a:p>
@@ -6444,73 +6447,67 @@
             <p:ph type="title"/>
           </p:nvPr>
         </p:nvSpPr>
-        <p:spPr>
-          <a:xfrm>
-            <a:off x="1045580" y="198388"/>
-            <a:ext cx="10364451" cy="707775"/>
-          </a:xfrm>
-        </p:spPr>
+        <p:spPr/>
         <p:txBody>
           <a:bodyPr/>
           <a:lstStyle/>
           <a:p>
             <a:r>
               <a:rPr lang="en-US" dirty="0" smtClean="0"/>
-              <a:t>Box</a:t>
+              <a:t>CSS </a:t>
             </a:r>
             <a:r>
               <a:rPr lang="bg-BG" dirty="0" smtClean="0"/>
-              <a:t> модел</a:t>
+              <a:t>РАЗМЕРИ НА ЕЛЕМЕНТИТЕ</a:t>
             </a:r>
             <a:endParaRPr lang="en-US" dirty="0"/>
           </a:p>
         </p:txBody>
       </p:sp>
-      <p:pic>
-        <p:nvPicPr>
-          <p:cNvPr id="2050" name="Picture 2" descr="http://guistuff.com/css/images/boxmodel.png"/>
-          <p:cNvPicPr>
-            <a:picLocks noChangeAspect="1" noChangeArrowheads="1"/>
-          </p:cNvPicPr>
-          <p:nvPr/>
-        </p:nvPicPr>
-        <p:blipFill>
-          <a:blip r:embed="rId2">
-            <a:extLst>
-              <a:ext uri="{28A0092B-C50C-407E-A947-70E740481C1C}">
-                <a14:useLocalDpi xmlns:a14="http://schemas.microsoft.com/office/drawing/2010/main" val="0"/>
-              </a:ext>
-            </a:extLst>
-          </a:blip>
-          <a:srcRect/>
-          <a:stretch>
-            <a:fillRect/>
-          </a:stretch>
-        </p:blipFill>
-        <p:spPr bwMode="auto">
-          <a:xfrm>
-            <a:off x="1587713" y="1275580"/>
-            <a:ext cx="9280183" cy="5209929"/>
-          </a:xfrm>
-          <a:prstGeom prst="rect">
-            <a:avLst/>
-          </a:prstGeom>
-          <a:noFill/>
-          <a:extLst>
-            <a:ext uri="{909E8E84-426E-40DD-AFC4-6F175D3DCCD1}">
-              <a14:hiddenFill xmlns:a14="http://schemas.microsoft.com/office/drawing/2010/main">
-                <a:solidFill>
-                  <a:srgbClr val="FFFFFF"/>
-                </a:solidFill>
-              </a14:hiddenFill>
-            </a:ext>
-          </a:extLst>
-        </p:spPr>
-      </p:pic>
+      <p:sp>
+        <p:nvSpPr>
+          <p:cNvPr id="3" name="Content Placeholder 2"/>
+          <p:cNvSpPr>
+            <a:spLocks noGrp="1"/>
+          </p:cNvSpPr>
+          <p:nvPr>
+            <p:ph sz="quarter" idx="13"/>
+          </p:nvPr>
+        </p:nvSpPr>
+        <p:spPr/>
+        <p:txBody>
+          <a:bodyPr/>
+          <a:lstStyle/>
+          <a:p>
+            <a:r>
+              <a:rPr lang="bg-BG" dirty="0" smtClean="0"/>
+              <a:t>МЕРНИ ЕДИНИЦИ</a:t>
+            </a:r>
+          </a:p>
+          <a:p>
+            <a:r>
+              <a:rPr lang="en-US" dirty="0" smtClean="0"/>
+              <a:t>WIDTH, HEIGHT, MARGIN, PADDING, BORDER</a:t>
+            </a:r>
+            <a:r>
+              <a:rPr lang="bg-BG" dirty="0" smtClean="0"/>
+              <a:t>, РАЗМЕР НА ШРИФТА</a:t>
+            </a:r>
+            <a:endParaRPr lang="en-US" dirty="0" smtClean="0"/>
+          </a:p>
+          <a:p>
+            <a:r>
+              <a:rPr lang="bg-BG" dirty="0" smtClean="0"/>
+              <a:t>КАК ДА МЕНЪЖИРАМЕ ПРАВИЛНО РАЗМЕРИТЕ</a:t>
+            </a:r>
+            <a:endParaRPr lang="en-US" dirty="0"/>
+          </a:p>
+        </p:txBody>
+      </p:sp>
     </p:spTree>
     <p:extLst>
       <p:ext uri="{BB962C8B-B14F-4D97-AF65-F5344CB8AC3E}">
-        <p14:creationId xmlns:p14="http://schemas.microsoft.com/office/powerpoint/2010/main" val="3026991479"/>
+        <p14:creationId xmlns:p14="http://schemas.microsoft.com/office/powerpoint/2010/main" val="942149458"/>
       </p:ext>
     </p:extLst>
   </p:cSld>
@@ -6547,67 +6544,73 @@
             <p:ph type="title"/>
           </p:nvPr>
         </p:nvSpPr>
-        <p:spPr/>
+        <p:spPr>
+          <a:xfrm>
+            <a:off x="1045580" y="198388"/>
+            <a:ext cx="10364451" cy="707775"/>
+          </a:xfrm>
+        </p:spPr>
         <p:txBody>
           <a:bodyPr/>
           <a:lstStyle/>
           <a:p>
             <a:r>
               <a:rPr lang="en-US" dirty="0" smtClean="0"/>
-              <a:t>CSS </a:t>
+              <a:t>Box</a:t>
             </a:r>
             <a:r>
               <a:rPr lang="bg-BG" dirty="0" smtClean="0"/>
-              <a:t>РАЗМЕРИ НА ЕЛЕМЕНТИТЕ</a:t>
+              <a:t> модел</a:t>
             </a:r>
             <a:endParaRPr lang="en-US" dirty="0"/>
           </a:p>
         </p:txBody>
       </p:sp>
-      <p:sp>
-        <p:nvSpPr>
-          <p:cNvPr id="3" name="Content Placeholder 2"/>
-          <p:cNvSpPr>
-            <a:spLocks noGrp="1"/>
-          </p:cNvSpPr>
-          <p:nvPr>
-            <p:ph sz="quarter" idx="13"/>
-          </p:nvPr>
-        </p:nvSpPr>
-        <p:spPr/>
-        <p:txBody>
-          <a:bodyPr/>
-          <a:lstStyle/>
-          <a:p>
-            <a:r>
-              <a:rPr lang="bg-BG" dirty="0" smtClean="0"/>
-              <a:t>МЕРНИ ЕДИНИЦИ</a:t>
-            </a:r>
-          </a:p>
-          <a:p>
-            <a:r>
-              <a:rPr lang="en-US" dirty="0" smtClean="0"/>
-              <a:t>WIDTH, HEIGHT, MARGIN, PADDING, BORDER</a:t>
-            </a:r>
-            <a:r>
-              <a:rPr lang="bg-BG" dirty="0" smtClean="0"/>
-              <a:t>, РАЗМЕР НА ШРИФТА</a:t>
-            </a:r>
-            <a:endParaRPr lang="en-US" dirty="0" smtClean="0"/>
-          </a:p>
-          <a:p>
-            <a:r>
-              <a:rPr lang="bg-BG" dirty="0" smtClean="0"/>
-              <a:t>КАК ДА МЕНЪЖИРАМЕ ПРАВИЛНО РАЗМЕРИТЕ</a:t>
-            </a:r>
-            <a:endParaRPr lang="en-US" dirty="0"/>
-          </a:p>
-        </p:txBody>
-      </p:sp>
+      <p:pic>
+        <p:nvPicPr>
+          <p:cNvPr id="2050" name="Picture 2" descr="http://guistuff.com/css/images/boxmodel.png"/>
+          <p:cNvPicPr>
+            <a:picLocks noChangeAspect="1" noChangeArrowheads="1"/>
+          </p:cNvPicPr>
+          <p:nvPr/>
+        </p:nvPicPr>
+        <p:blipFill>
+          <a:blip r:embed="rId2">
+            <a:extLst>
+              <a:ext uri="{28A0092B-C50C-407E-A947-70E740481C1C}">
+                <a14:useLocalDpi xmlns:a14="http://schemas.microsoft.com/office/drawing/2010/main" val="0"/>
+              </a:ext>
+            </a:extLst>
+          </a:blip>
+          <a:srcRect/>
+          <a:stretch>
+            <a:fillRect/>
+          </a:stretch>
+        </p:blipFill>
+        <p:spPr bwMode="auto">
+          <a:xfrm>
+            <a:off x="1587713" y="1275580"/>
+            <a:ext cx="9280183" cy="5209929"/>
+          </a:xfrm>
+          <a:prstGeom prst="rect">
+            <a:avLst/>
+          </a:prstGeom>
+          <a:noFill/>
+          <a:extLst>
+            <a:ext uri="{909E8E84-426E-40DD-AFC4-6F175D3DCCD1}">
+              <a14:hiddenFill xmlns:a14="http://schemas.microsoft.com/office/drawing/2010/main">
+                <a:solidFill>
+                  <a:srgbClr val="FFFFFF"/>
+                </a:solidFill>
+              </a14:hiddenFill>
+            </a:ext>
+          </a:extLst>
+        </p:spPr>
+      </p:pic>
     </p:spTree>
     <p:extLst>
       <p:ext uri="{BB962C8B-B14F-4D97-AF65-F5344CB8AC3E}">
-        <p14:creationId xmlns:p14="http://schemas.microsoft.com/office/powerpoint/2010/main" val="942149458"/>
+        <p14:creationId xmlns:p14="http://schemas.microsoft.com/office/powerpoint/2010/main" val="3026991479"/>
       </p:ext>
     </p:extLst>
   </p:cSld>
@@ -7244,57 +7247,62 @@
           <a:p>
             <a:r>
               <a:rPr lang="bg-BG" dirty="0" smtClean="0"/>
-              <a:t>въпроси</a:t>
+              <a:t>Прозрачност на елементите</a:t>
             </a:r>
             <a:endParaRPr lang="en-US" dirty="0"/>
           </a:p>
         </p:txBody>
       </p:sp>
-      <p:pic>
-        <p:nvPicPr>
-          <p:cNvPr id="1026" name="Picture 2" descr="http://fensafitters.files.wordpress.com/2013/10/question-_130787843.jpg"/>
-          <p:cNvPicPr>
-            <a:picLocks noChangeAspect="1" noChangeArrowheads="1"/>
-          </p:cNvPicPr>
-          <p:nvPr/>
-        </p:nvPicPr>
-        <p:blipFill>
-          <a:blip r:embed="rId2">
-            <a:extLst>
-              <a:ext uri="{28A0092B-C50C-407E-A947-70E740481C1C}">
-                <a14:useLocalDpi xmlns:a14="http://schemas.microsoft.com/office/drawing/2010/main" val="0"/>
-              </a:ext>
-            </a:extLst>
-          </a:blip>
-          <a:srcRect/>
-          <a:stretch>
-            <a:fillRect/>
-          </a:stretch>
-        </p:blipFill>
-        <p:spPr bwMode="auto">
-          <a:xfrm>
-            <a:off x="3682786" y="1813269"/>
-            <a:ext cx="4826428" cy="4826428"/>
-          </a:xfrm>
-          <a:prstGeom prst="rect">
-            <a:avLst/>
-          </a:prstGeom>
-          <a:noFill/>
-          <a:extLst>
-            <a:ext uri="{909E8E84-426E-40DD-AFC4-6F175D3DCCD1}">
-              <a14:hiddenFill xmlns:a14="http://schemas.microsoft.com/office/drawing/2010/main">
-                <a:solidFill>
-                  <a:srgbClr val="FFFFFF"/>
-                </a:solidFill>
-              </a14:hiddenFill>
-            </a:ext>
-          </a:extLst>
-        </p:spPr>
-      </p:pic>
+      <p:sp>
+        <p:nvSpPr>
+          <p:cNvPr id="3" name="Content Placeholder 2"/>
+          <p:cNvSpPr>
+            <a:spLocks noGrp="1"/>
+          </p:cNvSpPr>
+          <p:nvPr>
+            <p:ph sz="quarter" idx="13"/>
+          </p:nvPr>
+        </p:nvSpPr>
+        <p:spPr/>
+        <p:txBody>
+          <a:bodyPr/>
+          <a:lstStyle/>
+          <a:p>
+            <a:r>
+              <a:rPr lang="en-US" dirty="0" smtClean="0"/>
+              <a:t>Opacity – </a:t>
+            </a:r>
+            <a:r>
+              <a:rPr lang="bg-BG" dirty="0" smtClean="0"/>
+              <a:t>означава непрозрачност</a:t>
+            </a:r>
+            <a:endParaRPr lang="en-US" dirty="0" smtClean="0"/>
+          </a:p>
+          <a:p>
+            <a:r>
+              <a:rPr lang="bg-BG" dirty="0" smtClean="0"/>
+              <a:t>Стойности от 0 до 1</a:t>
+            </a:r>
+          </a:p>
+          <a:p>
+            <a:r>
+              <a:rPr lang="bg-BG" dirty="0" smtClean="0"/>
+              <a:t>Употребява се за анимации</a:t>
+            </a:r>
+          </a:p>
+          <a:p>
+            <a:r>
+              <a:rPr lang="bg-BG" dirty="0" smtClean="0"/>
+              <a:t>Внимателна употреба</a:t>
+            </a:r>
+            <a:endParaRPr lang="en-US" dirty="0"/>
+          </a:p>
+        </p:txBody>
+      </p:sp>
     </p:spTree>
     <p:extLst>
       <p:ext uri="{BB962C8B-B14F-4D97-AF65-F5344CB8AC3E}">
-        <p14:creationId xmlns:p14="http://schemas.microsoft.com/office/powerpoint/2010/main" val="977852502"/>
+        <p14:creationId xmlns:p14="http://schemas.microsoft.com/office/powerpoint/2010/main" val="4263928602"/>
       </p:ext>
     </p:extLst>
   </p:cSld>
@@ -7403,6 +7411,339 @@
     <p:extLst>
       <p:ext uri="{BB962C8B-B14F-4D97-AF65-F5344CB8AC3E}">
         <p14:creationId xmlns:p14="http://schemas.microsoft.com/office/powerpoint/2010/main" val="1280358112"/>
+      </p:ext>
+    </p:extLst>
+  </p:cSld>
+  <p:clrMapOvr>
+    <a:masterClrMapping/>
+  </p:clrMapOvr>
+</p:sld>
+</file>
+
+<file path=ppt/slides/slide20.xml><?xml version="1.0" encoding="utf-8"?>
+<p:sld xmlns:a="http://schemas.openxmlformats.org/drawingml/2006/main" xmlns:r="http://schemas.openxmlformats.org/officeDocument/2006/relationships" xmlns:p="http://schemas.openxmlformats.org/presentationml/2006/main">
+  <p:cSld>
+    <p:spTree>
+      <p:nvGrpSpPr>
+        <p:cNvPr id="1" name=""/>
+        <p:cNvGrpSpPr/>
+        <p:nvPr/>
+      </p:nvGrpSpPr>
+      <p:grpSpPr>
+        <a:xfrm>
+          <a:off x="0" y="0"/>
+          <a:ext cx="0" cy="0"/>
+          <a:chOff x="0" y="0"/>
+          <a:chExt cx="0" cy="0"/>
+        </a:xfrm>
+      </p:grpSpPr>
+      <p:sp>
+        <p:nvSpPr>
+          <p:cNvPr id="2" name="Title 1"/>
+          <p:cNvSpPr>
+            <a:spLocks noGrp="1"/>
+          </p:cNvSpPr>
+          <p:nvPr>
+            <p:ph type="title"/>
+          </p:nvPr>
+        </p:nvSpPr>
+        <p:spPr>
+          <a:xfrm>
+            <a:off x="946726" y="214864"/>
+            <a:ext cx="10364451" cy="773678"/>
+          </a:xfrm>
+        </p:spPr>
+        <p:txBody>
+          <a:bodyPr/>
+          <a:lstStyle/>
+          <a:p>
+            <a:r>
+              <a:rPr lang="bg-BG" dirty="0" smtClean="0"/>
+              <a:t>П</a:t>
+            </a:r>
+            <a:r>
+              <a:rPr lang="bg-BG" dirty="0"/>
+              <a:t>р</a:t>
+            </a:r>
+            <a:r>
+              <a:rPr lang="bg-BG" dirty="0" smtClean="0"/>
+              <a:t>озрачност демонстрация</a:t>
+            </a:r>
+            <a:endParaRPr lang="en-US" dirty="0"/>
+          </a:p>
+        </p:txBody>
+      </p:sp>
+      <p:pic>
+        <p:nvPicPr>
+          <p:cNvPr id="1026" name="Picture 2" descr="http://www.silverlightbuzz.com/images/colourspots.jpg"/>
+          <p:cNvPicPr>
+            <a:picLocks noChangeAspect="1" noChangeArrowheads="1"/>
+          </p:cNvPicPr>
+          <p:nvPr/>
+        </p:nvPicPr>
+        <p:blipFill>
+          <a:blip r:embed="rId2">
+            <a:extLst>
+              <a:ext uri="{28A0092B-C50C-407E-A947-70E740481C1C}">
+                <a14:useLocalDpi xmlns:a14="http://schemas.microsoft.com/office/drawing/2010/main" val="0"/>
+              </a:ext>
+            </a:extLst>
+          </a:blip>
+          <a:srcRect/>
+          <a:stretch>
+            <a:fillRect/>
+          </a:stretch>
+        </p:blipFill>
+        <p:spPr bwMode="auto">
+          <a:xfrm>
+            <a:off x="3661246" y="1062683"/>
+            <a:ext cx="4935409" cy="5443709"/>
+          </a:xfrm>
+          <a:prstGeom prst="rect">
+            <a:avLst/>
+          </a:prstGeom>
+          <a:noFill/>
+          <a:extLst>
+            <a:ext uri="{909E8E84-426E-40DD-AFC4-6F175D3DCCD1}">
+              <a14:hiddenFill xmlns:a14="http://schemas.microsoft.com/office/drawing/2010/main">
+                <a:solidFill>
+                  <a:srgbClr val="FFFFFF"/>
+                </a:solidFill>
+              </a14:hiddenFill>
+            </a:ext>
+          </a:extLst>
+        </p:spPr>
+      </p:pic>
+    </p:spTree>
+    <p:extLst>
+      <p:ext uri="{BB962C8B-B14F-4D97-AF65-F5344CB8AC3E}">
+        <p14:creationId xmlns:p14="http://schemas.microsoft.com/office/powerpoint/2010/main" val="1626813654"/>
+      </p:ext>
+    </p:extLst>
+  </p:cSld>
+  <p:clrMapOvr>
+    <a:masterClrMapping/>
+  </p:clrMapOvr>
+</p:sld>
+</file>
+
+<file path=ppt/slides/slide21.xml><?xml version="1.0" encoding="utf-8"?>
+<p:sld xmlns:a="http://schemas.openxmlformats.org/drawingml/2006/main" xmlns:r="http://schemas.openxmlformats.org/officeDocument/2006/relationships" xmlns:p="http://schemas.openxmlformats.org/presentationml/2006/main">
+  <p:cSld>
+    <p:spTree>
+      <p:nvGrpSpPr>
+        <p:cNvPr id="1" name=""/>
+        <p:cNvGrpSpPr/>
+        <p:nvPr/>
+      </p:nvGrpSpPr>
+      <p:grpSpPr>
+        <a:xfrm>
+          <a:off x="0" y="0"/>
+          <a:ext cx="0" cy="0"/>
+          <a:chOff x="0" y="0"/>
+          <a:chExt cx="0" cy="0"/>
+        </a:xfrm>
+      </p:grpSpPr>
+      <p:sp>
+        <p:nvSpPr>
+          <p:cNvPr id="2" name="Title 1"/>
+          <p:cNvSpPr>
+            <a:spLocks noGrp="1"/>
+          </p:cNvSpPr>
+          <p:nvPr>
+            <p:ph type="title"/>
+          </p:nvPr>
+        </p:nvSpPr>
+        <p:spPr/>
+        <p:txBody>
+          <a:bodyPr/>
+          <a:lstStyle/>
+          <a:p>
+            <a:r>
+              <a:rPr lang="bg-BG" dirty="0" smtClean="0"/>
+              <a:t>Задача </a:t>
+            </a:r>
+            <a:r>
+              <a:rPr lang="en-US" dirty="0" smtClean="0"/>
+              <a:t>CSS</a:t>
+            </a:r>
+            <a:endParaRPr lang="en-US" dirty="0"/>
+          </a:p>
+        </p:txBody>
+      </p:sp>
+      <p:sp>
+        <p:nvSpPr>
+          <p:cNvPr id="3" name="Content Placeholder 2"/>
+          <p:cNvSpPr>
+            <a:spLocks noGrp="1"/>
+          </p:cNvSpPr>
+          <p:nvPr>
+            <p:ph sz="quarter" idx="13"/>
+          </p:nvPr>
+        </p:nvSpPr>
+        <p:spPr/>
+        <p:txBody>
+          <a:bodyPr/>
+          <a:lstStyle/>
+          <a:p>
+            <a:r>
+              <a:rPr lang="bg-BG" dirty="0" smtClean="0"/>
+              <a:t>Направете уеб страница със светлосин фон. Страницата трябва да съдържа 2 картинки по избор. Под всяка една от картинките трябва да има кратко описание за съдържанието на картинката. Първият елемент (картинка и описание) трябва да е ограден с черен </a:t>
+            </a:r>
+            <a:r>
+              <a:rPr lang="en-US" dirty="0" smtClean="0"/>
+              <a:t>border </a:t>
+            </a:r>
+            <a:r>
+              <a:rPr lang="bg-BG" dirty="0" smtClean="0"/>
+              <a:t>с размер 2</a:t>
+            </a:r>
+            <a:r>
+              <a:rPr lang="en-US" dirty="0" err="1" smtClean="0"/>
+              <a:t>px</a:t>
+            </a:r>
+            <a:r>
+              <a:rPr lang="en-US" dirty="0" smtClean="0"/>
+              <a:t>. </a:t>
+            </a:r>
+            <a:r>
+              <a:rPr lang="bg-BG" dirty="0" smtClean="0"/>
+              <a:t>Вторият такъв елемент трябва да е ограден с тъмно червен </a:t>
+            </a:r>
+            <a:r>
+              <a:rPr lang="bg-BG" dirty="0" err="1" smtClean="0"/>
+              <a:t>бордер</a:t>
+            </a:r>
+            <a:r>
+              <a:rPr lang="bg-BG" dirty="0" smtClean="0"/>
+              <a:t> 1 </a:t>
+            </a:r>
+            <a:r>
+              <a:rPr lang="en-US" dirty="0" err="1" smtClean="0"/>
+              <a:t>px</a:t>
+            </a:r>
+            <a:r>
+              <a:rPr lang="en-US" dirty="0" smtClean="0"/>
+              <a:t>. </a:t>
+            </a:r>
+            <a:r>
+              <a:rPr lang="bg-BG" dirty="0"/>
+              <a:t> </a:t>
+            </a:r>
+            <a:r>
+              <a:rPr lang="bg-BG" dirty="0" smtClean="0"/>
+              <a:t>Шрифтовете на двете описания трябва да бъдат различни. Размерът на буквите на текста трябва да е </a:t>
+            </a:r>
+            <a:r>
+              <a:rPr lang="en-US" dirty="0" smtClean="0"/>
+              <a:t>14px. </a:t>
+            </a:r>
+            <a:r>
+              <a:rPr lang="bg-BG" dirty="0" smtClean="0"/>
+              <a:t>Една от картинките трябва да бъде полупрозрачна</a:t>
+            </a:r>
+            <a:endParaRPr lang="en-US" dirty="0"/>
+          </a:p>
+        </p:txBody>
+      </p:sp>
+    </p:spTree>
+    <p:extLst>
+      <p:ext uri="{BB962C8B-B14F-4D97-AF65-F5344CB8AC3E}">
+        <p14:creationId xmlns:p14="http://schemas.microsoft.com/office/powerpoint/2010/main" val="4087125913"/>
+      </p:ext>
+    </p:extLst>
+  </p:cSld>
+  <p:clrMapOvr>
+    <a:masterClrMapping/>
+  </p:clrMapOvr>
+</p:sld>
+</file>
+
+<file path=ppt/slides/slide22.xml><?xml version="1.0" encoding="utf-8"?>
+<p:sld xmlns:a="http://schemas.openxmlformats.org/drawingml/2006/main" xmlns:r="http://schemas.openxmlformats.org/officeDocument/2006/relationships" xmlns:p="http://schemas.openxmlformats.org/presentationml/2006/main">
+  <p:cSld>
+    <p:spTree>
+      <p:nvGrpSpPr>
+        <p:cNvPr id="1" name=""/>
+        <p:cNvGrpSpPr/>
+        <p:nvPr/>
+      </p:nvGrpSpPr>
+      <p:grpSpPr>
+        <a:xfrm>
+          <a:off x="0" y="0"/>
+          <a:ext cx="0" cy="0"/>
+          <a:chOff x="0" y="0"/>
+          <a:chExt cx="0" cy="0"/>
+        </a:xfrm>
+      </p:grpSpPr>
+      <p:sp>
+        <p:nvSpPr>
+          <p:cNvPr id="2" name="Title 1"/>
+          <p:cNvSpPr>
+            <a:spLocks noGrp="1"/>
+          </p:cNvSpPr>
+          <p:nvPr>
+            <p:ph type="title"/>
+          </p:nvPr>
+        </p:nvSpPr>
+        <p:spPr/>
+        <p:txBody>
+          <a:bodyPr/>
+          <a:lstStyle/>
+          <a:p>
+            <a:r>
+              <a:rPr lang="bg-BG" dirty="0" smtClean="0"/>
+              <a:t>въпроси</a:t>
+            </a:r>
+            <a:endParaRPr lang="en-US" dirty="0"/>
+          </a:p>
+        </p:txBody>
+      </p:sp>
+      <p:pic>
+        <p:nvPicPr>
+          <p:cNvPr id="1026" name="Picture 2" descr="http://fensafitters.files.wordpress.com/2013/10/question-_130787843.jpg"/>
+          <p:cNvPicPr>
+            <a:picLocks noChangeAspect="1" noChangeArrowheads="1"/>
+          </p:cNvPicPr>
+          <p:nvPr/>
+        </p:nvPicPr>
+        <p:blipFill>
+          <a:blip r:embed="rId2">
+            <a:extLst>
+              <a:ext uri="{28A0092B-C50C-407E-A947-70E740481C1C}">
+                <a14:useLocalDpi xmlns:a14="http://schemas.microsoft.com/office/drawing/2010/main" val="0"/>
+              </a:ext>
+            </a:extLst>
+          </a:blip>
+          <a:srcRect/>
+          <a:stretch>
+            <a:fillRect/>
+          </a:stretch>
+        </p:blipFill>
+        <p:spPr bwMode="auto">
+          <a:xfrm>
+            <a:off x="3682786" y="1813269"/>
+            <a:ext cx="4826428" cy="4826428"/>
+          </a:xfrm>
+          <a:prstGeom prst="rect">
+            <a:avLst/>
+          </a:prstGeom>
+          <a:noFill/>
+          <a:extLst>
+            <a:ext uri="{909E8E84-426E-40DD-AFC4-6F175D3DCCD1}">
+              <a14:hiddenFill xmlns:a14="http://schemas.microsoft.com/office/drawing/2010/main">
+                <a:solidFill>
+                  <a:srgbClr val="FFFFFF"/>
+                </a:solidFill>
+              </a14:hiddenFill>
+            </a:ext>
+          </a:extLst>
+        </p:spPr>
+      </p:pic>
+    </p:spTree>
+    <p:extLst>
+      <p:ext uri="{BB962C8B-B14F-4D97-AF65-F5344CB8AC3E}">
+        <p14:creationId xmlns:p14="http://schemas.microsoft.com/office/powerpoint/2010/main" val="977852502"/>
       </p:ext>
     </p:extLst>
   </p:cSld>

</xml_diff>

<commit_message>
Modified css lection and examples
</commit_message>
<xml_diff>
--- a/03.css-basics.pptx
+++ b/03.css-basics.pptx
@@ -26,7 +26,17 @@
     <p:sldId id="276" r:id="rId20"/>
     <p:sldId id="277" r:id="rId21"/>
     <p:sldId id="278" r:id="rId22"/>
-    <p:sldId id="275" r:id="rId23"/>
+    <p:sldId id="279" r:id="rId23"/>
+    <p:sldId id="280" r:id="rId24"/>
+    <p:sldId id="281" r:id="rId25"/>
+    <p:sldId id="282" r:id="rId26"/>
+    <p:sldId id="285" r:id="rId27"/>
+    <p:sldId id="284" r:id="rId28"/>
+    <p:sldId id="286" r:id="rId29"/>
+    <p:sldId id="283" r:id="rId30"/>
+    <p:sldId id="287" r:id="rId31"/>
+    <p:sldId id="288" r:id="rId32"/>
+    <p:sldId id="275" r:id="rId33"/>
   </p:sldIdLst>
   <p:sldSz cx="12192000" cy="6858000"/>
   <p:notesSz cx="6858000" cy="9144000"/>
@@ -7693,6 +7703,1656 @@
           <a:p>
             <a:r>
               <a:rPr lang="bg-BG" dirty="0" smtClean="0"/>
+              <a:t>Височина и ширина на елементите</a:t>
+            </a:r>
+            <a:endParaRPr lang="en-US" dirty="0"/>
+          </a:p>
+        </p:txBody>
+      </p:sp>
+      <p:sp>
+        <p:nvSpPr>
+          <p:cNvPr id="3" name="Content Placeholder 2"/>
+          <p:cNvSpPr>
+            <a:spLocks noGrp="1"/>
+          </p:cNvSpPr>
+          <p:nvPr>
+            <p:ph sz="quarter" idx="13"/>
+          </p:nvPr>
+        </p:nvSpPr>
+        <p:spPr/>
+        <p:txBody>
+          <a:bodyPr/>
+          <a:lstStyle/>
+          <a:p>
+            <a:r>
+              <a:rPr lang="en-US" dirty="0" smtClean="0"/>
+              <a:t>Width - </a:t>
+            </a:r>
+            <a:r>
+              <a:rPr lang="bg-BG" dirty="0" smtClean="0"/>
+              <a:t>определя ширината на елементите</a:t>
+            </a:r>
+          </a:p>
+          <a:p>
+            <a:r>
+              <a:rPr lang="bg-BG" dirty="0" smtClean="0"/>
+              <a:t>Определя ширината само за блокови елементи</a:t>
+            </a:r>
+            <a:r>
+              <a:rPr lang="en-US" dirty="0" smtClean="0"/>
+              <a:t> </a:t>
+            </a:r>
+            <a:r>
+              <a:rPr lang="bg-BG" dirty="0"/>
+              <a:t>(</a:t>
+            </a:r>
+            <a:r>
+              <a:rPr lang="en-US" dirty="0"/>
+              <a:t>div</a:t>
+            </a:r>
+            <a:r>
+              <a:rPr lang="bg-BG" dirty="0" smtClean="0"/>
+              <a:t>)</a:t>
+            </a:r>
+          </a:p>
+          <a:p>
+            <a:r>
+              <a:rPr lang="en-US" dirty="0" smtClean="0"/>
+              <a:t>Min-width, max-width – </a:t>
+            </a:r>
+            <a:r>
+              <a:rPr lang="bg-BG" dirty="0" smtClean="0"/>
+              <a:t>минимална максимална ширина</a:t>
+            </a:r>
+          </a:p>
+          <a:p>
+            <a:r>
+              <a:rPr lang="en-US" dirty="0" smtClean="0"/>
+              <a:t>Height – </a:t>
+            </a:r>
+            <a:r>
+              <a:rPr lang="bg-BG" dirty="0" smtClean="0"/>
+              <a:t>определя височината на елементите</a:t>
+            </a:r>
+          </a:p>
+          <a:p>
+            <a:r>
+              <a:rPr lang="bg-BG" dirty="0" smtClean="0"/>
+              <a:t>Отново важи само за блокови елементи (</a:t>
+            </a:r>
+            <a:r>
+              <a:rPr lang="en-US" dirty="0" smtClean="0"/>
+              <a:t>div</a:t>
+            </a:r>
+            <a:r>
+              <a:rPr lang="bg-BG" dirty="0" smtClean="0"/>
+              <a:t>)</a:t>
+            </a:r>
+            <a:endParaRPr lang="en-US" dirty="0" smtClean="0"/>
+          </a:p>
+          <a:p>
+            <a:r>
+              <a:rPr lang="en-US" dirty="0" smtClean="0"/>
+              <a:t>Min-height, max-height – </a:t>
+            </a:r>
+            <a:r>
+              <a:rPr lang="bg-BG" dirty="0" smtClean="0"/>
+              <a:t>минимална и максимална височина</a:t>
+            </a:r>
+            <a:endParaRPr lang="en-US" dirty="0" smtClean="0"/>
+          </a:p>
+          <a:p>
+            <a:endParaRPr lang="en-US" dirty="0"/>
+          </a:p>
+        </p:txBody>
+      </p:sp>
+      <p:graphicFrame>
+        <p:nvGraphicFramePr>
+          <p:cNvPr id="4" name="Object 3"/>
+          <p:cNvGraphicFramePr>
+            <a:graphicFrameLocks noChangeAspect="1"/>
+          </p:cNvGraphicFramePr>
+          <p:nvPr>
+            <p:extLst>
+              <p:ext uri="{D42A27DB-BD31-4B8C-83A1-F6EECF244321}">
+                <p14:modId xmlns:p14="http://schemas.microsoft.com/office/powerpoint/2010/main" val="837770452"/>
+              </p:ext>
+            </p:extLst>
+          </p:nvPr>
+        </p:nvGraphicFramePr>
+        <p:xfrm>
+          <a:off x="98425" y="98425"/>
+          <a:ext cx="949325" cy="533400"/>
+        </p:xfrm>
+        <a:graphic>
+          <a:graphicData uri="http://schemas.openxmlformats.org/presentationml/2006/ole">
+            <mc:AlternateContent xmlns:mc="http://schemas.openxmlformats.org/markup-compatibility/2006">
+              <mc:Choice xmlns:v="urn:schemas-microsoft-com:vml" Requires="v">
+                <p:oleObj spid="_x0000_s1113" name="Packager Shell Object" showAsIcon="1" r:id="rId3" imgW="948600" imgH="532800" progId="Package">
+                  <p:embed/>
+                </p:oleObj>
+              </mc:Choice>
+              <mc:Fallback>
+                <p:oleObj name="Packager Shell Object" showAsIcon="1" r:id="rId3" imgW="948600" imgH="532800" progId="Package">
+                  <p:embed/>
+                  <p:pic>
+                    <p:nvPicPr>
+                      <p:cNvPr id="0" name=""/>
+                      <p:cNvPicPr/>
+                      <p:nvPr/>
+                    </p:nvPicPr>
+                    <p:blipFill>
+                      <a:blip r:embed="rId4"/>
+                      <a:stretch>
+                        <a:fillRect/>
+                      </a:stretch>
+                    </p:blipFill>
+                    <p:spPr>
+                      <a:xfrm>
+                        <a:off x="98425" y="98425"/>
+                        <a:ext cx="949325" cy="533400"/>
+                      </a:xfrm>
+                      <a:prstGeom prst="rect">
+                        <a:avLst/>
+                      </a:prstGeom>
+                    </p:spPr>
+                  </p:pic>
+                </p:oleObj>
+              </mc:Fallback>
+            </mc:AlternateContent>
+          </a:graphicData>
+        </a:graphic>
+      </p:graphicFrame>
+      <p:graphicFrame>
+        <p:nvGraphicFramePr>
+          <p:cNvPr id="5" name="Object 4"/>
+          <p:cNvGraphicFramePr>
+            <a:graphicFrameLocks noChangeAspect="1"/>
+          </p:cNvGraphicFramePr>
+          <p:nvPr>
+            <p:extLst>
+              <p:ext uri="{D42A27DB-BD31-4B8C-83A1-F6EECF244321}">
+                <p14:modId xmlns:p14="http://schemas.microsoft.com/office/powerpoint/2010/main" val="665286430"/>
+              </p:ext>
+            </p:extLst>
+          </p:nvPr>
+        </p:nvGraphicFramePr>
+        <p:xfrm>
+          <a:off x="98425" y="98425"/>
+          <a:ext cx="949325" cy="533400"/>
+        </p:xfrm>
+        <a:graphic>
+          <a:graphicData uri="http://schemas.openxmlformats.org/presentationml/2006/ole">
+            <mc:AlternateContent xmlns:mc="http://schemas.openxmlformats.org/markup-compatibility/2006">
+              <mc:Choice xmlns:v="urn:schemas-microsoft-com:vml" Requires="v">
+                <p:oleObj spid="_x0000_s1114" name="Packager Shell Object" showAsIcon="1" r:id="rId5" imgW="948600" imgH="532800" progId="Package">
+                  <p:embed/>
+                </p:oleObj>
+              </mc:Choice>
+              <mc:Fallback>
+                <p:oleObj name="Packager Shell Object" showAsIcon="1" r:id="rId5" imgW="948600" imgH="532800" progId="Package">
+                  <p:embed/>
+                  <p:pic>
+                    <p:nvPicPr>
+                      <p:cNvPr id="0" name=""/>
+                      <p:cNvPicPr/>
+                      <p:nvPr/>
+                    </p:nvPicPr>
+                    <p:blipFill>
+                      <a:blip r:embed="rId6"/>
+                      <a:stretch>
+                        <a:fillRect/>
+                      </a:stretch>
+                    </p:blipFill>
+                    <p:spPr>
+                      <a:xfrm>
+                        <a:off x="98425" y="98425"/>
+                        <a:ext cx="949325" cy="533400"/>
+                      </a:xfrm>
+                      <a:prstGeom prst="rect">
+                        <a:avLst/>
+                      </a:prstGeom>
+                    </p:spPr>
+                  </p:pic>
+                </p:oleObj>
+              </mc:Fallback>
+            </mc:AlternateContent>
+          </a:graphicData>
+        </a:graphic>
+      </p:graphicFrame>
+    </p:spTree>
+    <p:extLst>
+      <p:ext uri="{BB962C8B-B14F-4D97-AF65-F5344CB8AC3E}">
+        <p14:creationId xmlns:p14="http://schemas.microsoft.com/office/powerpoint/2010/main" val="1289207421"/>
+      </p:ext>
+    </p:extLst>
+  </p:cSld>
+  <p:clrMapOvr>
+    <a:masterClrMapping/>
+  </p:clrMapOvr>
+</p:sld>
+</file>
+
+<file path=ppt/slides/slide23.xml><?xml version="1.0" encoding="utf-8"?>
+<p:sld xmlns:a="http://schemas.openxmlformats.org/drawingml/2006/main" xmlns:r="http://schemas.openxmlformats.org/officeDocument/2006/relationships" xmlns:p="http://schemas.openxmlformats.org/presentationml/2006/main">
+  <p:cSld>
+    <p:spTree>
+      <p:nvGrpSpPr>
+        <p:cNvPr id="1" name=""/>
+        <p:cNvGrpSpPr/>
+        <p:nvPr/>
+      </p:nvGrpSpPr>
+      <p:grpSpPr>
+        <a:xfrm>
+          <a:off x="0" y="0"/>
+          <a:ext cx="0" cy="0"/>
+          <a:chOff x="0" y="0"/>
+          <a:chExt cx="0" cy="0"/>
+        </a:xfrm>
+      </p:grpSpPr>
+      <p:sp>
+        <p:nvSpPr>
+          <p:cNvPr id="2" name="Title 1"/>
+          <p:cNvSpPr>
+            <a:spLocks noGrp="1"/>
+          </p:cNvSpPr>
+          <p:nvPr>
+            <p:ph type="title"/>
+          </p:nvPr>
+        </p:nvSpPr>
+        <p:spPr>
+          <a:xfrm>
+            <a:off x="913773" y="330193"/>
+            <a:ext cx="10364451" cy="806629"/>
+          </a:xfrm>
+        </p:spPr>
+        <p:txBody>
+          <a:bodyPr/>
+          <a:lstStyle/>
+          <a:p>
+            <a:r>
+              <a:rPr lang="en-US" dirty="0" err="1" smtClean="0"/>
+              <a:t>Css</a:t>
+            </a:r>
+            <a:r>
+              <a:rPr lang="en-US" dirty="0" smtClean="0"/>
+              <a:t> </a:t>
+            </a:r>
+            <a:r>
+              <a:rPr lang="bg-BG" dirty="0"/>
+              <a:t>Височина и ширина </a:t>
+            </a:r>
+            <a:r>
+              <a:rPr lang="bg-BG" dirty="0" smtClean="0"/>
+              <a:t>ДЕМО</a:t>
+            </a:r>
+            <a:endParaRPr lang="en-US" dirty="0"/>
+          </a:p>
+        </p:txBody>
+      </p:sp>
+      <p:pic>
+        <p:nvPicPr>
+          <p:cNvPr id="2050" name="Picture 2" descr="http://www.corelangs.com/css/box/img/box-model.png"/>
+          <p:cNvPicPr>
+            <a:picLocks noChangeAspect="1" noChangeArrowheads="1"/>
+          </p:cNvPicPr>
+          <p:nvPr/>
+        </p:nvPicPr>
+        <p:blipFill>
+          <a:blip r:embed="rId2">
+            <a:extLst>
+              <a:ext uri="{28A0092B-C50C-407E-A947-70E740481C1C}">
+                <a14:useLocalDpi xmlns:a14="http://schemas.microsoft.com/office/drawing/2010/main" val="0"/>
+              </a:ext>
+            </a:extLst>
+          </a:blip>
+          <a:srcRect/>
+          <a:stretch>
+            <a:fillRect/>
+          </a:stretch>
+        </p:blipFill>
+        <p:spPr bwMode="auto">
+          <a:xfrm>
+            <a:off x="2285528" y="1877496"/>
+            <a:ext cx="7620943" cy="4753507"/>
+          </a:xfrm>
+          <a:prstGeom prst="rect">
+            <a:avLst/>
+          </a:prstGeom>
+          <a:noFill/>
+          <a:extLst>
+            <a:ext uri="{909E8E84-426E-40DD-AFC4-6F175D3DCCD1}">
+              <a14:hiddenFill xmlns:a14="http://schemas.microsoft.com/office/drawing/2010/main">
+                <a:solidFill>
+                  <a:srgbClr val="FFFFFF"/>
+                </a:solidFill>
+              </a14:hiddenFill>
+            </a:ext>
+          </a:extLst>
+        </p:spPr>
+      </p:pic>
+    </p:spTree>
+    <p:extLst>
+      <p:ext uri="{BB962C8B-B14F-4D97-AF65-F5344CB8AC3E}">
+        <p14:creationId xmlns:p14="http://schemas.microsoft.com/office/powerpoint/2010/main" val="273775957"/>
+      </p:ext>
+    </p:extLst>
+  </p:cSld>
+  <p:clrMapOvr>
+    <a:masterClrMapping/>
+  </p:clrMapOvr>
+</p:sld>
+</file>
+
+<file path=ppt/slides/slide24.xml><?xml version="1.0" encoding="utf-8"?>
+<p:sld xmlns:a="http://schemas.openxmlformats.org/drawingml/2006/main" xmlns:r="http://schemas.openxmlformats.org/officeDocument/2006/relationships" xmlns:p="http://schemas.openxmlformats.org/presentationml/2006/main">
+  <p:cSld>
+    <p:spTree>
+      <p:nvGrpSpPr>
+        <p:cNvPr id="1" name=""/>
+        <p:cNvGrpSpPr/>
+        <p:nvPr/>
+      </p:nvGrpSpPr>
+      <p:grpSpPr>
+        <a:xfrm>
+          <a:off x="0" y="0"/>
+          <a:ext cx="0" cy="0"/>
+          <a:chOff x="0" y="0"/>
+          <a:chExt cx="0" cy="0"/>
+        </a:xfrm>
+      </p:grpSpPr>
+      <p:sp>
+        <p:nvSpPr>
+          <p:cNvPr id="2" name="Title 1"/>
+          <p:cNvSpPr>
+            <a:spLocks noGrp="1"/>
+          </p:cNvSpPr>
+          <p:nvPr>
+            <p:ph type="title"/>
+          </p:nvPr>
+        </p:nvSpPr>
+        <p:spPr/>
+        <p:txBody>
+          <a:bodyPr/>
+          <a:lstStyle/>
+          <a:p>
+            <a:r>
+              <a:rPr lang="en-US" dirty="0" err="1" smtClean="0"/>
+              <a:t>Css</a:t>
+            </a:r>
+            <a:r>
+              <a:rPr lang="en-US" dirty="0" smtClean="0"/>
+              <a:t> Overflow</a:t>
+            </a:r>
+            <a:endParaRPr lang="en-US" dirty="0"/>
+          </a:p>
+        </p:txBody>
+      </p:sp>
+      <p:sp>
+        <p:nvSpPr>
+          <p:cNvPr id="3" name="Content Placeholder 2"/>
+          <p:cNvSpPr>
+            <a:spLocks noGrp="1"/>
+          </p:cNvSpPr>
+          <p:nvPr>
+            <p:ph sz="quarter" idx="13"/>
+          </p:nvPr>
+        </p:nvSpPr>
+        <p:spPr/>
+        <p:txBody>
+          <a:bodyPr/>
+          <a:lstStyle/>
+          <a:p>
+            <a:r>
+              <a:rPr lang="en-US" dirty="0" smtClean="0"/>
+              <a:t>Overflow: </a:t>
+            </a:r>
+            <a:r>
+              <a:rPr lang="bg-BG" dirty="0" smtClean="0"/>
+              <a:t>определя поведението на елементите, когато размерите им не са достатъчни за визуализация на съдържанието им</a:t>
+            </a:r>
+          </a:p>
+          <a:p>
+            <a:r>
+              <a:rPr lang="en-US" dirty="0" err="1" smtClean="0"/>
+              <a:t>Overflow:visible</a:t>
+            </a:r>
+            <a:r>
+              <a:rPr lang="en-US" dirty="0" smtClean="0"/>
+              <a:t> – </a:t>
+            </a:r>
+            <a:r>
+              <a:rPr lang="bg-BG" dirty="0" smtClean="0"/>
+              <a:t>съдържанието излиза извън елемента</a:t>
+            </a:r>
+          </a:p>
+          <a:p>
+            <a:r>
+              <a:rPr lang="en-US" dirty="0" err="1" smtClean="0"/>
+              <a:t>Overflow:Scroll</a:t>
+            </a:r>
+            <a:r>
+              <a:rPr lang="bg-BG" dirty="0"/>
+              <a:t> </a:t>
+            </a:r>
+            <a:r>
+              <a:rPr lang="bg-BG" dirty="0" smtClean="0"/>
+              <a:t>-</a:t>
+            </a:r>
+            <a:r>
+              <a:rPr lang="en-US" dirty="0" smtClean="0"/>
+              <a:t> </a:t>
+            </a:r>
+            <a:r>
+              <a:rPr lang="bg-BG" dirty="0" smtClean="0"/>
+              <a:t>елемента се визуализира със </a:t>
+            </a:r>
+            <a:r>
+              <a:rPr lang="en-US" dirty="0" smtClean="0"/>
+              <a:t>scrollbar</a:t>
+            </a:r>
+          </a:p>
+          <a:p>
+            <a:r>
+              <a:rPr lang="en-US" dirty="0" err="1" smtClean="0"/>
+              <a:t>Overflow:auto</a:t>
+            </a:r>
+            <a:r>
+              <a:rPr lang="bg-BG" dirty="0" smtClean="0"/>
+              <a:t> – показва се </a:t>
+            </a:r>
+            <a:r>
+              <a:rPr lang="en-US" dirty="0" smtClean="0"/>
+              <a:t>scrollbar </a:t>
+            </a:r>
+            <a:r>
+              <a:rPr lang="bg-BG" dirty="0" smtClean="0"/>
+              <a:t>само ако това е нужно</a:t>
+            </a:r>
+          </a:p>
+          <a:p>
+            <a:r>
+              <a:rPr lang="en-US" dirty="0" smtClean="0"/>
+              <a:t>Overflow: hidden – </a:t>
+            </a:r>
+            <a:r>
+              <a:rPr lang="bg-BG" dirty="0" smtClean="0"/>
+              <a:t>съдържанието, което не се побира се скрива от страницата </a:t>
+            </a:r>
+          </a:p>
+          <a:p>
+            <a:endParaRPr lang="en-US" dirty="0"/>
+          </a:p>
+        </p:txBody>
+      </p:sp>
+    </p:spTree>
+    <p:extLst>
+      <p:ext uri="{BB962C8B-B14F-4D97-AF65-F5344CB8AC3E}">
+        <p14:creationId xmlns:p14="http://schemas.microsoft.com/office/powerpoint/2010/main" val="3128077565"/>
+      </p:ext>
+    </p:extLst>
+  </p:cSld>
+  <p:clrMapOvr>
+    <a:masterClrMapping/>
+  </p:clrMapOvr>
+</p:sld>
+</file>
+
+<file path=ppt/slides/slide25.xml><?xml version="1.0" encoding="utf-8"?>
+<p:sld xmlns:a="http://schemas.openxmlformats.org/drawingml/2006/main" xmlns:r="http://schemas.openxmlformats.org/officeDocument/2006/relationships" xmlns:p="http://schemas.openxmlformats.org/presentationml/2006/main">
+  <p:cSld>
+    <p:spTree>
+      <p:nvGrpSpPr>
+        <p:cNvPr id="1" name=""/>
+        <p:cNvGrpSpPr/>
+        <p:nvPr/>
+      </p:nvGrpSpPr>
+      <p:grpSpPr>
+        <a:xfrm>
+          <a:off x="0" y="0"/>
+          <a:ext cx="0" cy="0"/>
+          <a:chOff x="0" y="0"/>
+          <a:chExt cx="0" cy="0"/>
+        </a:xfrm>
+      </p:grpSpPr>
+      <p:sp>
+        <p:nvSpPr>
+          <p:cNvPr id="2" name="Title 1"/>
+          <p:cNvSpPr>
+            <a:spLocks noGrp="1"/>
+          </p:cNvSpPr>
+          <p:nvPr>
+            <p:ph type="title"/>
+          </p:nvPr>
+        </p:nvSpPr>
+        <p:spPr/>
+        <p:txBody>
+          <a:bodyPr/>
+          <a:lstStyle/>
+          <a:p>
+            <a:r>
+              <a:rPr lang="en-US" dirty="0" smtClean="0"/>
+              <a:t>CSS display</a:t>
+            </a:r>
+            <a:endParaRPr lang="en-US" dirty="0"/>
+          </a:p>
+        </p:txBody>
+      </p:sp>
+      <p:sp>
+        <p:nvSpPr>
+          <p:cNvPr id="3" name="Content Placeholder 2"/>
+          <p:cNvSpPr>
+            <a:spLocks noGrp="1"/>
+          </p:cNvSpPr>
+          <p:nvPr>
+            <p:ph sz="quarter" idx="13"/>
+          </p:nvPr>
+        </p:nvSpPr>
+        <p:spPr/>
+        <p:txBody>
+          <a:bodyPr/>
+          <a:lstStyle/>
+          <a:p>
+            <a:r>
+              <a:rPr lang="bg-BG" dirty="0" smtClean="0"/>
+              <a:t>Контролира как се визуализира съответният елемент и дали след него да има нов ред. </a:t>
+            </a:r>
+          </a:p>
+          <a:p>
+            <a:r>
+              <a:rPr lang="bg-BG" dirty="0" smtClean="0"/>
+              <a:t>Определя поведението на </a:t>
+            </a:r>
+            <a:r>
+              <a:rPr lang="en-US" dirty="0" smtClean="0"/>
+              <a:t>width </a:t>
+            </a:r>
+            <a:r>
+              <a:rPr lang="bg-BG" dirty="0" smtClean="0"/>
+              <a:t>И </a:t>
+            </a:r>
+            <a:r>
+              <a:rPr lang="en-US" dirty="0" smtClean="0"/>
+              <a:t>height</a:t>
+            </a:r>
+          </a:p>
+          <a:p>
+            <a:r>
+              <a:rPr lang="bg-BG" dirty="0" smtClean="0"/>
+              <a:t> особено важен за определянето на цялостния дизайн на страницата</a:t>
+            </a:r>
+          </a:p>
+          <a:p>
+            <a:r>
+              <a:rPr lang="bg-BG" dirty="0" smtClean="0"/>
+              <a:t>Широко използван на позициониране на елементите</a:t>
+            </a:r>
+          </a:p>
+        </p:txBody>
+      </p:sp>
+    </p:spTree>
+    <p:extLst>
+      <p:ext uri="{BB962C8B-B14F-4D97-AF65-F5344CB8AC3E}">
+        <p14:creationId xmlns:p14="http://schemas.microsoft.com/office/powerpoint/2010/main" val="3467250241"/>
+      </p:ext>
+    </p:extLst>
+  </p:cSld>
+  <p:clrMapOvr>
+    <a:masterClrMapping/>
+  </p:clrMapOvr>
+</p:sld>
+</file>
+
+<file path=ppt/slides/slide26.xml><?xml version="1.0" encoding="utf-8"?>
+<p:sld xmlns:a="http://schemas.openxmlformats.org/drawingml/2006/main" xmlns:r="http://schemas.openxmlformats.org/officeDocument/2006/relationships" xmlns:p="http://schemas.openxmlformats.org/presentationml/2006/main">
+  <p:cSld>
+    <p:spTree>
+      <p:nvGrpSpPr>
+        <p:cNvPr id="1" name=""/>
+        <p:cNvGrpSpPr/>
+        <p:nvPr/>
+      </p:nvGrpSpPr>
+      <p:grpSpPr>
+        <a:xfrm>
+          <a:off x="0" y="0"/>
+          <a:ext cx="0" cy="0"/>
+          <a:chOff x="0" y="0"/>
+          <a:chExt cx="0" cy="0"/>
+        </a:xfrm>
+      </p:grpSpPr>
+      <p:sp>
+        <p:nvSpPr>
+          <p:cNvPr id="2" name="Title 1"/>
+          <p:cNvSpPr>
+            <a:spLocks noGrp="1"/>
+          </p:cNvSpPr>
+          <p:nvPr>
+            <p:ph type="title"/>
+          </p:nvPr>
+        </p:nvSpPr>
+        <p:spPr/>
+        <p:txBody>
+          <a:bodyPr/>
+          <a:lstStyle/>
+          <a:p>
+            <a:r>
+              <a:rPr lang="en-US" dirty="0"/>
+              <a:t>CSS display</a:t>
+            </a:r>
+          </a:p>
+        </p:txBody>
+      </p:sp>
+      <p:sp>
+        <p:nvSpPr>
+          <p:cNvPr id="3" name="Content Placeholder 2"/>
+          <p:cNvSpPr>
+            <a:spLocks noGrp="1"/>
+          </p:cNvSpPr>
+          <p:nvPr>
+            <p:ph sz="quarter" idx="13"/>
+          </p:nvPr>
+        </p:nvSpPr>
+        <p:spPr>
+          <a:xfrm>
+            <a:off x="913774" y="1861752"/>
+            <a:ext cx="10363826" cy="4258962"/>
+          </a:xfrm>
+        </p:spPr>
+        <p:txBody>
+          <a:bodyPr>
+            <a:normAutofit fontScale="92500"/>
+          </a:bodyPr>
+          <a:lstStyle/>
+          <a:p>
+            <a:r>
+              <a:rPr lang="en-US" dirty="0" err="1" smtClean="0"/>
+              <a:t>Display:inline</a:t>
+            </a:r>
+            <a:r>
+              <a:rPr lang="en-US" dirty="0" smtClean="0"/>
+              <a:t> – </a:t>
+            </a:r>
+            <a:r>
+              <a:rPr lang="bg-BG" dirty="0" smtClean="0"/>
+              <a:t>преди и след елемента не се поставя нов ред – следващият елемент остава на този ред. Ширината и височината на елемента се определят от съдържанието му, не от стойностите на </a:t>
+            </a:r>
+            <a:r>
+              <a:rPr lang="en-US" dirty="0" err="1" smtClean="0"/>
+              <a:t>css</a:t>
+            </a:r>
+            <a:r>
+              <a:rPr lang="en-US" dirty="0" smtClean="0"/>
+              <a:t> width </a:t>
+            </a:r>
+            <a:r>
+              <a:rPr lang="bg-BG" dirty="0" smtClean="0"/>
+              <a:t>и </a:t>
+            </a:r>
+            <a:r>
+              <a:rPr lang="en-US" dirty="0" smtClean="0"/>
+              <a:t>height</a:t>
+            </a:r>
+          </a:p>
+          <a:p>
+            <a:r>
+              <a:rPr lang="en-US" dirty="0" err="1" smtClean="0"/>
+              <a:t>Display:block</a:t>
+            </a:r>
+            <a:r>
+              <a:rPr lang="en-US" dirty="0" smtClean="0"/>
+              <a:t> – </a:t>
+            </a:r>
+            <a:r>
+              <a:rPr lang="bg-BG" dirty="0" smtClean="0"/>
+              <a:t>преди и след елемента се поставя нов ред. Ширината и височината на елемента се определят както от съдържанието му, така и от </a:t>
+            </a:r>
+            <a:r>
+              <a:rPr lang="en-US" dirty="0" err="1" smtClean="0"/>
+              <a:t>css</a:t>
+            </a:r>
+            <a:r>
+              <a:rPr lang="en-US" dirty="0" smtClean="0"/>
+              <a:t> width </a:t>
+            </a:r>
+            <a:r>
+              <a:rPr lang="bg-BG" dirty="0" smtClean="0"/>
+              <a:t>И </a:t>
+            </a:r>
+            <a:r>
+              <a:rPr lang="en-US" dirty="0" smtClean="0"/>
+              <a:t>height</a:t>
+            </a:r>
+          </a:p>
+          <a:p>
+            <a:r>
+              <a:rPr lang="en-US" dirty="0" err="1"/>
+              <a:t>Display:</a:t>
+            </a:r>
+            <a:r>
+              <a:rPr lang="en-US" dirty="0" err="1" smtClean="0"/>
+              <a:t>None</a:t>
+            </a:r>
+            <a:r>
+              <a:rPr lang="en-US" dirty="0" smtClean="0"/>
+              <a:t> – </a:t>
+            </a:r>
+            <a:r>
+              <a:rPr lang="bg-BG" dirty="0" smtClean="0"/>
+              <a:t>елементът не се вижда на страницата</a:t>
+            </a:r>
+          </a:p>
+          <a:p>
+            <a:r>
+              <a:rPr lang="en-US" dirty="0" err="1"/>
+              <a:t>Display:</a:t>
+            </a:r>
+            <a:r>
+              <a:rPr lang="en-US" dirty="0" err="1" smtClean="0"/>
+              <a:t>Inline-block</a:t>
+            </a:r>
+            <a:r>
+              <a:rPr lang="en-US" dirty="0" smtClean="0"/>
+              <a:t> – </a:t>
+            </a:r>
+            <a:r>
+              <a:rPr lang="bg-BG" dirty="0" smtClean="0"/>
+              <a:t>преди и след елемента не се поставя нов ред, но за разлика от </a:t>
+            </a:r>
+            <a:r>
+              <a:rPr lang="en-US" dirty="0" smtClean="0"/>
+              <a:t>inline </a:t>
+            </a:r>
+            <a:r>
+              <a:rPr lang="en-US" dirty="0" err="1" smtClean="0"/>
+              <a:t>css</a:t>
+            </a:r>
+            <a:r>
+              <a:rPr lang="en-US" dirty="0" smtClean="0"/>
+              <a:t> width </a:t>
+            </a:r>
+            <a:r>
+              <a:rPr lang="bg-BG" dirty="0" smtClean="0"/>
+              <a:t>И </a:t>
+            </a:r>
+            <a:r>
+              <a:rPr lang="en-US" dirty="0" smtClean="0"/>
+              <a:t>height </a:t>
+            </a:r>
+            <a:r>
+              <a:rPr lang="bg-BG" dirty="0" smtClean="0"/>
+              <a:t>могат да определят ширината и височината</a:t>
+            </a:r>
+          </a:p>
+          <a:p>
+            <a:r>
+              <a:rPr lang="en-US" dirty="0" err="1" smtClean="0"/>
+              <a:t>Display:table</a:t>
+            </a:r>
+            <a:r>
+              <a:rPr lang="en-US" dirty="0" smtClean="0"/>
+              <a:t>, table-row, table-cell </a:t>
+            </a:r>
+            <a:r>
+              <a:rPr lang="bg-BG" dirty="0" smtClean="0"/>
+              <a:t>– елементите се подреждат като таблица – не се препоръчва.</a:t>
+            </a:r>
+          </a:p>
+          <a:p>
+            <a:endParaRPr lang="en-US" dirty="0"/>
+          </a:p>
+        </p:txBody>
+      </p:sp>
+    </p:spTree>
+    <p:extLst>
+      <p:ext uri="{BB962C8B-B14F-4D97-AF65-F5344CB8AC3E}">
+        <p14:creationId xmlns:p14="http://schemas.microsoft.com/office/powerpoint/2010/main" val="3724262119"/>
+      </p:ext>
+    </p:extLst>
+  </p:cSld>
+  <p:clrMapOvr>
+    <a:masterClrMapping/>
+  </p:clrMapOvr>
+</p:sld>
+</file>
+
+<file path=ppt/slides/slide27.xml><?xml version="1.0" encoding="utf-8"?>
+<p:sld xmlns:a="http://schemas.openxmlformats.org/drawingml/2006/main" xmlns:r="http://schemas.openxmlformats.org/officeDocument/2006/relationships" xmlns:p="http://schemas.openxmlformats.org/presentationml/2006/main">
+  <p:cSld>
+    <p:spTree>
+      <p:nvGrpSpPr>
+        <p:cNvPr id="1" name=""/>
+        <p:cNvGrpSpPr/>
+        <p:nvPr/>
+      </p:nvGrpSpPr>
+      <p:grpSpPr>
+        <a:xfrm>
+          <a:off x="0" y="0"/>
+          <a:ext cx="0" cy="0"/>
+          <a:chOff x="0" y="0"/>
+          <a:chExt cx="0" cy="0"/>
+        </a:xfrm>
+      </p:grpSpPr>
+      <p:sp>
+        <p:nvSpPr>
+          <p:cNvPr id="2" name="Title 1"/>
+          <p:cNvSpPr>
+            <a:spLocks noGrp="1"/>
+          </p:cNvSpPr>
+          <p:nvPr>
+            <p:ph type="title"/>
+          </p:nvPr>
+        </p:nvSpPr>
+        <p:spPr/>
+        <p:txBody>
+          <a:bodyPr/>
+          <a:lstStyle/>
+          <a:p>
+            <a:r>
+              <a:rPr lang="en-US" dirty="0" err="1" smtClean="0"/>
+              <a:t>Css</a:t>
+            </a:r>
+            <a:r>
+              <a:rPr lang="en-US" dirty="0" smtClean="0"/>
+              <a:t> Display </a:t>
+            </a:r>
+            <a:r>
+              <a:rPr lang="bg-BG" dirty="0" err="1" smtClean="0"/>
+              <a:t>ДЕмо</a:t>
+            </a:r>
+            <a:endParaRPr lang="en-US" dirty="0"/>
+          </a:p>
+        </p:txBody>
+      </p:sp>
+      <p:pic>
+        <p:nvPicPr>
+          <p:cNvPr id="3074" name="Picture 2" descr="http://2.bp.blogspot.com/_nKxzQGcCLtQ/TBYPAJ6xM4I/AAAAAAAAAC8/lG6XemOXosU/s1600/css.png"/>
+          <p:cNvPicPr>
+            <a:picLocks noChangeAspect="1" noChangeArrowheads="1"/>
+          </p:cNvPicPr>
+          <p:nvPr/>
+        </p:nvPicPr>
+        <p:blipFill>
+          <a:blip r:embed="rId2">
+            <a:extLst>
+              <a:ext uri="{28A0092B-C50C-407E-A947-70E740481C1C}">
+                <a14:useLocalDpi xmlns:a14="http://schemas.microsoft.com/office/drawing/2010/main" val="0"/>
+              </a:ext>
+            </a:extLst>
+          </a:blip>
+          <a:srcRect/>
+          <a:stretch>
+            <a:fillRect/>
+          </a:stretch>
+        </p:blipFill>
+        <p:spPr bwMode="auto">
+          <a:xfrm>
+            <a:off x="2343193" y="1934863"/>
+            <a:ext cx="7505614" cy="4598376"/>
+          </a:xfrm>
+          <a:prstGeom prst="rect">
+            <a:avLst/>
+          </a:prstGeom>
+          <a:noFill/>
+          <a:extLst>
+            <a:ext uri="{909E8E84-426E-40DD-AFC4-6F175D3DCCD1}">
+              <a14:hiddenFill xmlns:a14="http://schemas.microsoft.com/office/drawing/2010/main">
+                <a:solidFill>
+                  <a:srgbClr val="FFFFFF"/>
+                </a:solidFill>
+              </a14:hiddenFill>
+            </a:ext>
+          </a:extLst>
+        </p:spPr>
+      </p:pic>
+    </p:spTree>
+    <p:extLst>
+      <p:ext uri="{BB962C8B-B14F-4D97-AF65-F5344CB8AC3E}">
+        <p14:creationId xmlns:p14="http://schemas.microsoft.com/office/powerpoint/2010/main" val="3554688199"/>
+      </p:ext>
+    </p:extLst>
+  </p:cSld>
+  <p:clrMapOvr>
+    <a:masterClrMapping/>
+  </p:clrMapOvr>
+</p:sld>
+</file>
+
+<file path=ppt/slides/slide28.xml><?xml version="1.0" encoding="utf-8"?>
+<p:sld xmlns:a="http://schemas.openxmlformats.org/drawingml/2006/main" xmlns:r="http://schemas.openxmlformats.org/officeDocument/2006/relationships" xmlns:p="http://schemas.openxmlformats.org/presentationml/2006/main">
+  <p:cSld>
+    <p:spTree>
+      <p:nvGrpSpPr>
+        <p:cNvPr id="1" name=""/>
+        <p:cNvGrpSpPr/>
+        <p:nvPr/>
+      </p:nvGrpSpPr>
+      <p:grpSpPr>
+        <a:xfrm>
+          <a:off x="0" y="0"/>
+          <a:ext cx="0" cy="0"/>
+          <a:chOff x="0" y="0"/>
+          <a:chExt cx="0" cy="0"/>
+        </a:xfrm>
+      </p:grpSpPr>
+      <p:sp>
+        <p:nvSpPr>
+          <p:cNvPr id="2" name="Title 1"/>
+          <p:cNvSpPr>
+            <a:spLocks noGrp="1"/>
+          </p:cNvSpPr>
+          <p:nvPr>
+            <p:ph type="title"/>
+          </p:nvPr>
+        </p:nvSpPr>
+        <p:spPr/>
+        <p:txBody>
+          <a:bodyPr/>
+          <a:lstStyle/>
+          <a:p>
+            <a:r>
+              <a:rPr lang="en-US" dirty="0" err="1" smtClean="0"/>
+              <a:t>Css</a:t>
+            </a:r>
+            <a:r>
+              <a:rPr lang="en-US" dirty="0" smtClean="0"/>
+              <a:t> visibility</a:t>
+            </a:r>
+            <a:endParaRPr lang="en-US" dirty="0"/>
+          </a:p>
+        </p:txBody>
+      </p:sp>
+      <p:sp>
+        <p:nvSpPr>
+          <p:cNvPr id="3" name="Content Placeholder 2"/>
+          <p:cNvSpPr>
+            <a:spLocks noGrp="1"/>
+          </p:cNvSpPr>
+          <p:nvPr>
+            <p:ph sz="quarter" idx="13"/>
+          </p:nvPr>
+        </p:nvSpPr>
+        <p:spPr/>
+        <p:txBody>
+          <a:bodyPr/>
+          <a:lstStyle/>
+          <a:p>
+            <a:r>
+              <a:rPr lang="en-US" dirty="0" smtClean="0"/>
+              <a:t>Visibility – </a:t>
+            </a:r>
+            <a:r>
+              <a:rPr lang="bg-BG" dirty="0" smtClean="0"/>
+              <a:t>определя дали елемента се вижда на страницата </a:t>
+            </a:r>
+          </a:p>
+          <a:p>
+            <a:r>
+              <a:rPr lang="en-US" dirty="0" smtClean="0"/>
+              <a:t>Visibility</a:t>
+            </a:r>
+            <a:r>
+              <a:rPr lang="bg-BG" dirty="0" smtClean="0"/>
+              <a:t>:</a:t>
+            </a:r>
+            <a:r>
+              <a:rPr lang="en-US" dirty="0" smtClean="0"/>
+              <a:t>hidden – </a:t>
+            </a:r>
+            <a:r>
+              <a:rPr lang="bg-BG" dirty="0" smtClean="0"/>
+              <a:t>елемента не се вижда на страницата</a:t>
+            </a:r>
+          </a:p>
+          <a:p>
+            <a:r>
+              <a:rPr lang="en-US" dirty="0" err="1" smtClean="0"/>
+              <a:t>Visibility:visible</a:t>
+            </a:r>
+            <a:r>
+              <a:rPr lang="en-US" dirty="0" smtClean="0"/>
+              <a:t> – </a:t>
+            </a:r>
+            <a:r>
+              <a:rPr lang="bg-BG" dirty="0" smtClean="0"/>
+              <a:t>елемента се вижда на страницата</a:t>
+            </a:r>
+          </a:p>
+          <a:p>
+            <a:r>
+              <a:rPr lang="bg-BG" dirty="0" smtClean="0"/>
+              <a:t>Разлика между </a:t>
+            </a:r>
+            <a:r>
+              <a:rPr lang="en-US" dirty="0" smtClean="0"/>
+              <a:t>display</a:t>
+            </a:r>
+            <a:r>
+              <a:rPr lang="bg-BG" dirty="0" smtClean="0"/>
+              <a:t>:</a:t>
+            </a:r>
+            <a:r>
+              <a:rPr lang="en-US" dirty="0" smtClean="0"/>
+              <a:t>none</a:t>
+            </a:r>
+            <a:r>
+              <a:rPr lang="bg-BG" dirty="0" smtClean="0"/>
+              <a:t> и </a:t>
+            </a:r>
+            <a:r>
+              <a:rPr lang="en-US" dirty="0" err="1" smtClean="0"/>
+              <a:t>visibility:hidden</a:t>
+            </a:r>
+            <a:endParaRPr lang="en-US" dirty="0"/>
+          </a:p>
+        </p:txBody>
+      </p:sp>
+    </p:spTree>
+    <p:extLst>
+      <p:ext uri="{BB962C8B-B14F-4D97-AF65-F5344CB8AC3E}">
+        <p14:creationId xmlns:p14="http://schemas.microsoft.com/office/powerpoint/2010/main" val="2721504433"/>
+      </p:ext>
+    </p:extLst>
+  </p:cSld>
+  <p:clrMapOvr>
+    <a:masterClrMapping/>
+  </p:clrMapOvr>
+</p:sld>
+</file>
+
+<file path=ppt/slides/slide29.xml><?xml version="1.0" encoding="utf-8"?>
+<p:sld xmlns:a="http://schemas.openxmlformats.org/drawingml/2006/main" xmlns:r="http://schemas.openxmlformats.org/officeDocument/2006/relationships" xmlns:p="http://schemas.openxmlformats.org/presentationml/2006/main">
+  <p:cSld>
+    <p:spTree>
+      <p:nvGrpSpPr>
+        <p:cNvPr id="1" name=""/>
+        <p:cNvGrpSpPr/>
+        <p:nvPr/>
+      </p:nvGrpSpPr>
+      <p:grpSpPr>
+        <a:xfrm>
+          <a:off x="0" y="0"/>
+          <a:ext cx="0" cy="0"/>
+          <a:chOff x="0" y="0"/>
+          <a:chExt cx="0" cy="0"/>
+        </a:xfrm>
+      </p:grpSpPr>
+      <p:sp>
+        <p:nvSpPr>
+          <p:cNvPr id="2" name="Title 1"/>
+          <p:cNvSpPr>
+            <a:spLocks noGrp="1"/>
+          </p:cNvSpPr>
+          <p:nvPr>
+            <p:ph type="title"/>
+          </p:nvPr>
+        </p:nvSpPr>
+        <p:spPr/>
+        <p:txBody>
+          <a:bodyPr/>
+          <a:lstStyle/>
+          <a:p>
+            <a:r>
+              <a:rPr lang="en-US" dirty="0" smtClean="0"/>
+              <a:t>CSS </a:t>
+            </a:r>
+            <a:r>
+              <a:rPr lang="bg-BG" dirty="0" smtClean="0"/>
+              <a:t>Позициониране</a:t>
+            </a:r>
+            <a:endParaRPr lang="en-US" dirty="0"/>
+          </a:p>
+        </p:txBody>
+      </p:sp>
+      <p:sp>
+        <p:nvSpPr>
+          <p:cNvPr id="3" name="Content Placeholder 2"/>
+          <p:cNvSpPr>
+            <a:spLocks noGrp="1"/>
+          </p:cNvSpPr>
+          <p:nvPr>
+            <p:ph sz="quarter" idx="13"/>
+          </p:nvPr>
+        </p:nvSpPr>
+        <p:spPr/>
+        <p:txBody>
+          <a:bodyPr>
+            <a:normAutofit fontScale="85000" lnSpcReduction="10000"/>
+          </a:bodyPr>
+          <a:lstStyle/>
+          <a:p>
+            <a:r>
+              <a:rPr lang="en-US" dirty="0" smtClean="0"/>
+              <a:t>Position – </a:t>
+            </a:r>
+            <a:r>
+              <a:rPr lang="bg-BG" dirty="0" smtClean="0"/>
+              <a:t>определя точната позиция на елемента на страницата</a:t>
+            </a:r>
+          </a:p>
+          <a:p>
+            <a:r>
+              <a:rPr lang="en-US" dirty="0" err="1" smtClean="0"/>
+              <a:t>Postion:static</a:t>
+            </a:r>
+            <a:r>
+              <a:rPr lang="bg-BG" dirty="0"/>
+              <a:t> </a:t>
+            </a:r>
+            <a:r>
+              <a:rPr lang="bg-BG" dirty="0" smtClean="0"/>
+              <a:t>– (по подразбиране) елемента се позиционира спрямо правилата за </a:t>
+            </a:r>
+            <a:r>
+              <a:rPr lang="en-US" dirty="0" smtClean="0"/>
+              <a:t>CSS display</a:t>
+            </a:r>
+          </a:p>
+          <a:p>
+            <a:r>
+              <a:rPr lang="en-US" dirty="0" err="1" smtClean="0"/>
+              <a:t>Postion:Relative</a:t>
+            </a:r>
+            <a:r>
+              <a:rPr lang="bg-BG" dirty="0"/>
+              <a:t> </a:t>
+            </a:r>
+            <a:r>
+              <a:rPr lang="bg-BG" dirty="0" smtClean="0"/>
+              <a:t>-</a:t>
+            </a:r>
+            <a:r>
+              <a:rPr lang="en-US" dirty="0" smtClean="0"/>
+              <a:t> </a:t>
+            </a:r>
+            <a:r>
+              <a:rPr lang="bg-BG" dirty="0" smtClean="0"/>
+              <a:t>позиционира се релативно (относително) спрямо позицията, която би заел по подразбиране</a:t>
+            </a:r>
+          </a:p>
+          <a:p>
+            <a:r>
+              <a:rPr lang="en-US" dirty="0" err="1" smtClean="0"/>
+              <a:t>Position:absolute</a:t>
+            </a:r>
+            <a:r>
+              <a:rPr lang="bg-BG" dirty="0" smtClean="0"/>
+              <a:t> – позиционира се относно най-близкия родител позициониран </a:t>
+            </a:r>
+            <a:r>
+              <a:rPr lang="en-US" dirty="0" smtClean="0"/>
+              <a:t>relative </a:t>
+            </a:r>
+            <a:r>
+              <a:rPr lang="bg-BG" dirty="0" smtClean="0"/>
+              <a:t>Или </a:t>
+            </a:r>
+            <a:r>
+              <a:rPr lang="en-US" dirty="0" smtClean="0"/>
+              <a:t>static</a:t>
+            </a:r>
+          </a:p>
+          <a:p>
+            <a:r>
+              <a:rPr lang="en-US" dirty="0" smtClean="0"/>
+              <a:t>Fixed: </a:t>
+            </a:r>
+            <a:r>
+              <a:rPr lang="bg-BG" dirty="0" smtClean="0"/>
+              <a:t>позиционира се по координати (пиксели) на страницата</a:t>
+            </a:r>
+            <a:r>
+              <a:rPr lang="en-US" dirty="0" smtClean="0"/>
+              <a:t> </a:t>
+            </a:r>
+            <a:endParaRPr lang="bg-BG" dirty="0" smtClean="0"/>
+          </a:p>
+          <a:p>
+            <a:r>
+              <a:rPr lang="en-US" dirty="0" smtClean="0"/>
+              <a:t>Z-index –</a:t>
+            </a:r>
+            <a:r>
+              <a:rPr lang="bg-BG" dirty="0" smtClean="0"/>
+              <a:t> при елементи на едно йерархично ниво, определя кой елемент да се визуализира по-напред</a:t>
+            </a:r>
+            <a:endParaRPr lang="en-US" dirty="0"/>
+          </a:p>
+        </p:txBody>
+      </p:sp>
+    </p:spTree>
+    <p:extLst>
+      <p:ext uri="{BB962C8B-B14F-4D97-AF65-F5344CB8AC3E}">
+        <p14:creationId xmlns:p14="http://schemas.microsoft.com/office/powerpoint/2010/main" val="930758534"/>
+      </p:ext>
+    </p:extLst>
+  </p:cSld>
+  <p:clrMapOvr>
+    <a:masterClrMapping/>
+  </p:clrMapOvr>
+</p:sld>
+</file>
+
+<file path=ppt/slides/slide3.xml><?xml version="1.0" encoding="utf-8"?>
+<p:sld xmlns:a="http://schemas.openxmlformats.org/drawingml/2006/main" xmlns:r="http://schemas.openxmlformats.org/officeDocument/2006/relationships" xmlns:p="http://schemas.openxmlformats.org/presentationml/2006/main">
+  <p:cSld>
+    <p:spTree>
+      <p:nvGrpSpPr>
+        <p:cNvPr id="1" name=""/>
+        <p:cNvGrpSpPr/>
+        <p:nvPr/>
+      </p:nvGrpSpPr>
+      <p:grpSpPr>
+        <a:xfrm>
+          <a:off x="0" y="0"/>
+          <a:ext cx="0" cy="0"/>
+          <a:chOff x="0" y="0"/>
+          <a:chExt cx="0" cy="0"/>
+        </a:xfrm>
+      </p:grpSpPr>
+      <p:sp>
+        <p:nvSpPr>
+          <p:cNvPr id="2" name="Title 1"/>
+          <p:cNvSpPr>
+            <a:spLocks noGrp="1"/>
+          </p:cNvSpPr>
+          <p:nvPr>
+            <p:ph type="title"/>
+          </p:nvPr>
+        </p:nvSpPr>
+        <p:spPr/>
+        <p:txBody>
+          <a:bodyPr/>
+          <a:lstStyle/>
+          <a:p>
+            <a:r>
+              <a:rPr lang="bg-BG" dirty="0" smtClean="0"/>
+              <a:t>Как да използваме </a:t>
+            </a:r>
+            <a:r>
+              <a:rPr lang="en-US" dirty="0" err="1" smtClean="0"/>
+              <a:t>css</a:t>
+            </a:r>
+            <a:endParaRPr lang="en-US" dirty="0"/>
+          </a:p>
+        </p:txBody>
+      </p:sp>
+      <p:sp>
+        <p:nvSpPr>
+          <p:cNvPr id="3" name="Content Placeholder 2"/>
+          <p:cNvSpPr>
+            <a:spLocks noGrp="1"/>
+          </p:cNvSpPr>
+          <p:nvPr>
+            <p:ph sz="quarter" idx="13"/>
+          </p:nvPr>
+        </p:nvSpPr>
+        <p:spPr/>
+        <p:txBody>
+          <a:bodyPr/>
+          <a:lstStyle/>
+          <a:p>
+            <a:r>
+              <a:rPr lang="en-US" dirty="0" err="1" smtClean="0"/>
+              <a:t>Css</a:t>
+            </a:r>
+            <a:r>
+              <a:rPr lang="bg-BG" dirty="0"/>
+              <a:t> </a:t>
+            </a:r>
+            <a:r>
+              <a:rPr lang="bg-BG" dirty="0" smtClean="0"/>
+              <a:t>като </a:t>
+            </a:r>
+            <a:r>
+              <a:rPr lang="en-US" dirty="0" smtClean="0"/>
+              <a:t>html </a:t>
+            </a:r>
+            <a:r>
+              <a:rPr lang="bg-BG" dirty="0" smtClean="0"/>
+              <a:t>атрибут</a:t>
+            </a:r>
+          </a:p>
+          <a:p>
+            <a:r>
+              <a:rPr lang="en-US" dirty="0" err="1" smtClean="0"/>
+              <a:t>Css</a:t>
+            </a:r>
+            <a:r>
+              <a:rPr lang="en-US" dirty="0" smtClean="0"/>
+              <a:t> </a:t>
+            </a:r>
+            <a:r>
+              <a:rPr lang="bg-BG" dirty="0" smtClean="0"/>
+              <a:t>като част от страницата</a:t>
+            </a:r>
+          </a:p>
+          <a:p>
+            <a:r>
+              <a:rPr lang="en-US" dirty="0" err="1" smtClean="0"/>
+              <a:t>Css</a:t>
+            </a:r>
+            <a:r>
+              <a:rPr lang="en-US" dirty="0" smtClean="0"/>
+              <a:t> </a:t>
+            </a:r>
+            <a:r>
+              <a:rPr lang="bg-BG" dirty="0" smtClean="0"/>
+              <a:t>като отделен файл</a:t>
+            </a:r>
+            <a:endParaRPr lang="en-US" dirty="0" smtClean="0"/>
+          </a:p>
+          <a:p>
+            <a:r>
+              <a:rPr lang="bg-BG" dirty="0" smtClean="0"/>
+              <a:t>Предпочитан подход</a:t>
+            </a:r>
+            <a:endParaRPr lang="en-US" dirty="0"/>
+          </a:p>
+        </p:txBody>
+      </p:sp>
+    </p:spTree>
+    <p:extLst>
+      <p:ext uri="{BB962C8B-B14F-4D97-AF65-F5344CB8AC3E}">
+        <p14:creationId xmlns:p14="http://schemas.microsoft.com/office/powerpoint/2010/main" val="3244157007"/>
+      </p:ext>
+    </p:extLst>
+  </p:cSld>
+  <p:clrMapOvr>
+    <a:masterClrMapping/>
+  </p:clrMapOvr>
+</p:sld>
+</file>
+
+<file path=ppt/slides/slide30.xml><?xml version="1.0" encoding="utf-8"?>
+<p:sld xmlns:a="http://schemas.openxmlformats.org/drawingml/2006/main" xmlns:r="http://schemas.openxmlformats.org/officeDocument/2006/relationships" xmlns:p="http://schemas.openxmlformats.org/presentationml/2006/main">
+  <p:cSld>
+    <p:spTree>
+      <p:nvGrpSpPr>
+        <p:cNvPr id="1" name=""/>
+        <p:cNvGrpSpPr/>
+        <p:nvPr/>
+      </p:nvGrpSpPr>
+      <p:grpSpPr>
+        <a:xfrm>
+          <a:off x="0" y="0"/>
+          <a:ext cx="0" cy="0"/>
+          <a:chOff x="0" y="0"/>
+          <a:chExt cx="0" cy="0"/>
+        </a:xfrm>
+      </p:grpSpPr>
+      <p:sp>
+        <p:nvSpPr>
+          <p:cNvPr id="2" name="Title 1"/>
+          <p:cNvSpPr>
+            <a:spLocks noGrp="1"/>
+          </p:cNvSpPr>
+          <p:nvPr>
+            <p:ph type="title"/>
+          </p:nvPr>
+        </p:nvSpPr>
+        <p:spPr/>
+        <p:txBody>
+          <a:bodyPr/>
+          <a:lstStyle/>
+          <a:p>
+            <a:r>
+              <a:rPr lang="en-US" dirty="0" smtClean="0"/>
+              <a:t>CSS Floating</a:t>
+            </a:r>
+            <a:endParaRPr lang="en-US" dirty="0"/>
+          </a:p>
+        </p:txBody>
+      </p:sp>
+      <p:sp>
+        <p:nvSpPr>
+          <p:cNvPr id="3" name="Content Placeholder 2"/>
+          <p:cNvSpPr>
+            <a:spLocks noGrp="1"/>
+          </p:cNvSpPr>
+          <p:nvPr>
+            <p:ph sz="quarter" idx="13"/>
+          </p:nvPr>
+        </p:nvSpPr>
+        <p:spPr/>
+        <p:txBody>
+          <a:bodyPr/>
+          <a:lstStyle/>
+          <a:p>
+            <a:r>
+              <a:rPr lang="bg-BG" dirty="0" smtClean="0"/>
+              <a:t>Елементът се „залепя“ на една страна.</a:t>
+            </a:r>
+          </a:p>
+          <a:p>
+            <a:r>
+              <a:rPr lang="bg-BG" dirty="0" smtClean="0"/>
+              <a:t> Употребявайте </a:t>
+            </a:r>
+            <a:r>
+              <a:rPr lang="en-US" dirty="0" smtClean="0"/>
+              <a:t>float </a:t>
+            </a:r>
+            <a:r>
+              <a:rPr lang="bg-BG" dirty="0" smtClean="0"/>
+              <a:t>много внимателно</a:t>
+            </a:r>
+          </a:p>
+          <a:p>
+            <a:r>
+              <a:rPr lang="en-US" dirty="0" err="1" smtClean="0"/>
+              <a:t>Float:left</a:t>
+            </a:r>
+            <a:r>
+              <a:rPr lang="en-US" dirty="0" smtClean="0"/>
+              <a:t> – </a:t>
+            </a:r>
+            <a:r>
+              <a:rPr lang="bg-BG" dirty="0" smtClean="0"/>
+              <a:t>елементът се „залепя“ на лявата страна</a:t>
+            </a:r>
+          </a:p>
+          <a:p>
+            <a:r>
+              <a:rPr lang="en-US" dirty="0" err="1" smtClean="0"/>
+              <a:t>Float:right</a:t>
+            </a:r>
+            <a:r>
+              <a:rPr lang="en-US" dirty="0" smtClean="0"/>
+              <a:t> – </a:t>
+            </a:r>
+            <a:r>
+              <a:rPr lang="bg-BG" dirty="0"/>
+              <a:t>елементът се „залепя“ на </a:t>
+            </a:r>
+            <a:r>
+              <a:rPr lang="bg-BG" dirty="0" smtClean="0"/>
+              <a:t>дясната страна</a:t>
+            </a:r>
+          </a:p>
+          <a:p>
+            <a:r>
+              <a:rPr lang="en-US" dirty="0" smtClean="0"/>
+              <a:t>Clear: both – </a:t>
+            </a:r>
+            <a:r>
+              <a:rPr lang="bg-BG" dirty="0" smtClean="0"/>
+              <a:t>изчистват се всички </a:t>
+            </a:r>
+            <a:r>
+              <a:rPr lang="en-US" dirty="0" smtClean="0"/>
+              <a:t>float</a:t>
+            </a:r>
+            <a:r>
+              <a:rPr lang="bg-BG" dirty="0" smtClean="0"/>
+              <a:t>-</a:t>
+            </a:r>
+            <a:r>
+              <a:rPr lang="bg-BG" dirty="0" err="1" smtClean="0"/>
+              <a:t>нати</a:t>
+            </a:r>
+            <a:r>
+              <a:rPr lang="bg-BG" dirty="0" smtClean="0"/>
+              <a:t> елементи</a:t>
+            </a:r>
+            <a:endParaRPr lang="bg-BG" dirty="0"/>
+          </a:p>
+          <a:p>
+            <a:endParaRPr lang="bg-BG" dirty="0" smtClean="0"/>
+          </a:p>
+          <a:p>
+            <a:endParaRPr lang="en-US" dirty="0"/>
+          </a:p>
+        </p:txBody>
+      </p:sp>
+    </p:spTree>
+    <p:extLst>
+      <p:ext uri="{BB962C8B-B14F-4D97-AF65-F5344CB8AC3E}">
+        <p14:creationId xmlns:p14="http://schemas.microsoft.com/office/powerpoint/2010/main" val="1204937688"/>
+      </p:ext>
+    </p:extLst>
+  </p:cSld>
+  <p:clrMapOvr>
+    <a:masterClrMapping/>
+  </p:clrMapOvr>
+</p:sld>
+</file>
+
+<file path=ppt/slides/slide31.xml><?xml version="1.0" encoding="utf-8"?>
+<p:sld xmlns:a="http://schemas.openxmlformats.org/drawingml/2006/main" xmlns:r="http://schemas.openxmlformats.org/officeDocument/2006/relationships" xmlns:p="http://schemas.openxmlformats.org/presentationml/2006/main">
+  <p:cSld>
+    <p:spTree>
+      <p:nvGrpSpPr>
+        <p:cNvPr id="1" name=""/>
+        <p:cNvGrpSpPr/>
+        <p:nvPr/>
+      </p:nvGrpSpPr>
+      <p:grpSpPr>
+        <a:xfrm>
+          <a:off x="0" y="0"/>
+          <a:ext cx="0" cy="0"/>
+          <a:chOff x="0" y="0"/>
+          <a:chExt cx="0" cy="0"/>
+        </a:xfrm>
+      </p:grpSpPr>
+      <p:sp>
+        <p:nvSpPr>
+          <p:cNvPr id="2" name="Title 1"/>
+          <p:cNvSpPr>
+            <a:spLocks noGrp="1"/>
+          </p:cNvSpPr>
+          <p:nvPr>
+            <p:ph type="title"/>
+          </p:nvPr>
+        </p:nvSpPr>
+        <p:spPr/>
+        <p:txBody>
+          <a:bodyPr/>
+          <a:lstStyle/>
+          <a:p>
+            <a:r>
+              <a:rPr lang="en-US" dirty="0"/>
+              <a:t>CSS </a:t>
+            </a:r>
+            <a:r>
+              <a:rPr lang="en-US" dirty="0" smtClean="0"/>
+              <a:t>Floating</a:t>
+            </a:r>
+            <a:r>
+              <a:rPr lang="bg-BG" dirty="0" smtClean="0"/>
+              <a:t> демо</a:t>
+            </a:r>
+            <a:endParaRPr lang="en-US" dirty="0"/>
+          </a:p>
+        </p:txBody>
+      </p:sp>
+      <p:pic>
+        <p:nvPicPr>
+          <p:cNvPr id="4098" name="Picture 2" descr="http://css-tricks.com/wp-content/csstricks-uploads/web-text-wrap.png"/>
+          <p:cNvPicPr>
+            <a:picLocks noChangeAspect="1" noChangeArrowheads="1"/>
+          </p:cNvPicPr>
+          <p:nvPr/>
+        </p:nvPicPr>
+        <p:blipFill>
+          <a:blip r:embed="rId2">
+            <a:extLst>
+              <a:ext uri="{28A0092B-C50C-407E-A947-70E740481C1C}">
+                <a14:useLocalDpi xmlns:a14="http://schemas.microsoft.com/office/drawing/2010/main" val="0"/>
+              </a:ext>
+            </a:extLst>
+          </a:blip>
+          <a:srcRect/>
+          <a:stretch>
+            <a:fillRect/>
+          </a:stretch>
+        </p:blipFill>
+        <p:spPr bwMode="auto">
+          <a:xfrm>
+            <a:off x="1581193" y="1929842"/>
+            <a:ext cx="9029614" cy="4514809"/>
+          </a:xfrm>
+          <a:prstGeom prst="rect">
+            <a:avLst/>
+          </a:prstGeom>
+          <a:noFill/>
+          <a:extLst>
+            <a:ext uri="{909E8E84-426E-40DD-AFC4-6F175D3DCCD1}">
+              <a14:hiddenFill xmlns:a14="http://schemas.microsoft.com/office/drawing/2010/main">
+                <a:solidFill>
+                  <a:srgbClr val="FFFFFF"/>
+                </a:solidFill>
+              </a14:hiddenFill>
+            </a:ext>
+          </a:extLst>
+        </p:spPr>
+      </p:pic>
+    </p:spTree>
+    <p:extLst>
+      <p:ext uri="{BB962C8B-B14F-4D97-AF65-F5344CB8AC3E}">
+        <p14:creationId xmlns:p14="http://schemas.microsoft.com/office/powerpoint/2010/main" val="3368081634"/>
+      </p:ext>
+    </p:extLst>
+  </p:cSld>
+  <p:clrMapOvr>
+    <a:masterClrMapping/>
+  </p:clrMapOvr>
+</p:sld>
+</file>
+
+<file path=ppt/slides/slide32.xml><?xml version="1.0" encoding="utf-8"?>
+<p:sld xmlns:a="http://schemas.openxmlformats.org/drawingml/2006/main" xmlns:r="http://schemas.openxmlformats.org/officeDocument/2006/relationships" xmlns:p="http://schemas.openxmlformats.org/presentationml/2006/main">
+  <p:cSld>
+    <p:spTree>
+      <p:nvGrpSpPr>
+        <p:cNvPr id="1" name=""/>
+        <p:cNvGrpSpPr/>
+        <p:nvPr/>
+      </p:nvGrpSpPr>
+      <p:grpSpPr>
+        <a:xfrm>
+          <a:off x="0" y="0"/>
+          <a:ext cx="0" cy="0"/>
+          <a:chOff x="0" y="0"/>
+          <a:chExt cx="0" cy="0"/>
+        </a:xfrm>
+      </p:grpSpPr>
+      <p:sp>
+        <p:nvSpPr>
+          <p:cNvPr id="2" name="Title 1"/>
+          <p:cNvSpPr>
+            <a:spLocks noGrp="1"/>
+          </p:cNvSpPr>
+          <p:nvPr>
+            <p:ph type="title"/>
+          </p:nvPr>
+        </p:nvSpPr>
+        <p:spPr/>
+        <p:txBody>
+          <a:bodyPr/>
+          <a:lstStyle/>
+          <a:p>
+            <a:r>
+              <a:rPr lang="bg-BG" dirty="0" smtClean="0"/>
               <a:t>въпроси</a:t>
             </a:r>
             <a:endParaRPr lang="en-US" dirty="0"/>
@@ -7744,137 +9404,6 @@
     <p:extLst>
       <p:ext uri="{BB962C8B-B14F-4D97-AF65-F5344CB8AC3E}">
         <p14:creationId xmlns:p14="http://schemas.microsoft.com/office/powerpoint/2010/main" val="977852502"/>
-      </p:ext>
-    </p:extLst>
-  </p:cSld>
-  <p:clrMapOvr>
-    <a:masterClrMapping/>
-  </p:clrMapOvr>
-</p:sld>
-</file>
-
-<file path=ppt/slides/slide3.xml><?xml version="1.0" encoding="utf-8"?>
-<p:sld xmlns:a="http://schemas.openxmlformats.org/drawingml/2006/main" xmlns:r="http://schemas.openxmlformats.org/officeDocument/2006/relationships" xmlns:p="http://schemas.openxmlformats.org/presentationml/2006/main">
-  <p:cSld>
-    <p:spTree>
-      <p:nvGrpSpPr>
-        <p:cNvPr id="1" name=""/>
-        <p:cNvGrpSpPr/>
-        <p:nvPr/>
-      </p:nvGrpSpPr>
-      <p:grpSpPr>
-        <a:xfrm>
-          <a:off x="0" y="0"/>
-          <a:ext cx="0" cy="0"/>
-          <a:chOff x="0" y="0"/>
-          <a:chExt cx="0" cy="0"/>
-        </a:xfrm>
-      </p:grpSpPr>
-      <p:sp>
-        <p:nvSpPr>
-          <p:cNvPr id="2" name="Title 1"/>
-          <p:cNvSpPr>
-            <a:spLocks noGrp="1"/>
-          </p:cNvSpPr>
-          <p:nvPr>
-            <p:ph type="title"/>
-          </p:nvPr>
-        </p:nvSpPr>
-        <p:spPr/>
-        <p:txBody>
-          <a:bodyPr/>
-          <a:lstStyle/>
-          <a:p>
-            <a:r>
-              <a:rPr lang="bg-BG" dirty="0" smtClean="0"/>
-              <a:t>Как да използваме </a:t>
-            </a:r>
-            <a:r>
-              <a:rPr lang="en-US" dirty="0" err="1" smtClean="0"/>
-              <a:t>css</a:t>
-            </a:r>
-            <a:endParaRPr lang="en-US" dirty="0"/>
-          </a:p>
-        </p:txBody>
-      </p:sp>
-      <p:sp>
-        <p:nvSpPr>
-          <p:cNvPr id="3" name="Content Placeholder 2"/>
-          <p:cNvSpPr>
-            <a:spLocks noGrp="1"/>
-          </p:cNvSpPr>
-          <p:nvPr>
-            <p:ph sz="quarter" idx="13"/>
-          </p:nvPr>
-        </p:nvSpPr>
-        <p:spPr/>
-        <p:txBody>
-          <a:bodyPr/>
-          <a:lstStyle/>
-          <a:p>
-            <a:r>
-              <a:rPr lang="en-US" dirty="0" err="1" smtClean="0"/>
-              <a:t>Css</a:t>
-            </a:r>
-            <a:r>
-              <a:rPr lang="bg-BG" dirty="0"/>
-              <a:t> </a:t>
-            </a:r>
-            <a:r>
-              <a:rPr lang="bg-BG" dirty="0" smtClean="0"/>
-              <a:t>като </a:t>
-            </a:r>
-            <a:r>
-              <a:rPr lang="en-US" dirty="0" smtClean="0"/>
-              <a:t>html </a:t>
-            </a:r>
-            <a:r>
-              <a:rPr lang="bg-BG" dirty="0" smtClean="0"/>
-              <a:t>атрибут</a:t>
-            </a:r>
-          </a:p>
-          <a:p>
-            <a:r>
-              <a:rPr lang="en-US" dirty="0" err="1" smtClean="0"/>
-              <a:t>Css</a:t>
-            </a:r>
-            <a:r>
-              <a:rPr lang="en-US" dirty="0" smtClean="0"/>
-              <a:t> </a:t>
-            </a:r>
-            <a:r>
-              <a:rPr lang="bg-BG" dirty="0" smtClean="0"/>
-              <a:t>като част от страницата</a:t>
-            </a:r>
-          </a:p>
-          <a:p>
-            <a:r>
-              <a:rPr lang="en-US" dirty="0" err="1" smtClean="0"/>
-              <a:t>Css</a:t>
-            </a:r>
-            <a:r>
-              <a:rPr lang="en-US" dirty="0" smtClean="0"/>
-              <a:t> </a:t>
-            </a:r>
-            <a:r>
-              <a:rPr lang="bg-BG" dirty="0" smtClean="0"/>
-              <a:t>като отделен файл</a:t>
-            </a:r>
-            <a:endParaRPr lang="en-US" dirty="0" smtClean="0"/>
-          </a:p>
-          <a:p>
-            <a:r>
-              <a:rPr lang="bg-BG" dirty="0" smtClean="0"/>
-              <a:t>Предпочитан подход</a:t>
-            </a:r>
-            <a:endParaRPr lang="en-US" dirty="0"/>
-          </a:p>
-        </p:txBody>
-      </p:sp>
-    </p:spTree>
-    <p:extLst>
-      <p:ext uri="{BB962C8B-B14F-4D97-AF65-F5344CB8AC3E}">
-        <p14:creationId xmlns:p14="http://schemas.microsoft.com/office/powerpoint/2010/main" val="3244157007"/>
       </p:ext>
     </p:extLst>
   </p:cSld>

</xml_diff>